<commit_message>
Added a basic intro slide for techniques
</commit_message>
<xml_diff>
--- a/LDDTesting/stone-LDDTestingTechniques.pptx
+++ b/LDDTesting/stone-LDDTestingTechniques.pptx
@@ -25,6 +25,7 @@
     <p:sldId id="273" r:id="rId19"/>
     <p:sldId id="274" r:id="rId20"/>
     <p:sldId id="275" r:id="rId21"/>
+    <p:sldId id="276" r:id="rId22"/>
   </p:sldIdLst>
   <p:sldSz cx="9144000" cy="5143500" type="screen16x9"/>
   <p:notesSz cx="6858000" cy="9144000"/>
@@ -3228,6 +3229,90 @@
             <p:ph type="title"/>
           </p:nvPr>
         </p:nvSpPr>
+        <p:spPr/>
+        <p:txBody>
+          <a:bodyPr/>
+          <a:lstStyle/>
+          <a:p>
+            <a:pPr lvl="0" indent="0" marL="0">
+              <a:buNone/>
+            </a:pPr>
+            <a:r>
+              <a:rPr/>
+              <a:t>Monolithic tests</a:t>
+            </a:r>
+          </a:p>
+        </p:txBody>
+      </p:sp>
+      <p:sp>
+        <p:nvSpPr>
+          <p:cNvPr id="3" name="Content Placeholder 2"/>
+          <p:cNvSpPr>
+            <a:spLocks noGrp="1"/>
+          </p:cNvSpPr>
+          <p:nvPr>
+            <p:ph idx="1"/>
+          </p:nvPr>
+        </p:nvSpPr>
+        <p:spPr/>
+        <p:txBody>
+          <a:bodyPr/>
+          <a:lstStyle/>
+          <a:p>
+            <a:pPr lvl="0"/>
+            <a:r>
+              <a:rPr/>
+              <a:t>Multiple tests can be packed into a single label</a:t>
+            </a:r>
+          </a:p>
+          <a:p>
+            <a:pPr lvl="0"/>
+            <a:r>
+              <a:rPr/>
+              <a:t>Document each point where the test is expected to fail</a:t>
+            </a:r>
+          </a:p>
+          <a:p>
+            <a:pPr lvl="0"/>
+            <a:r>
+              <a:rPr/>
+              <a:t>Examine the output of the test run to determine if there are any missed failures</a:t>
+            </a:r>
+          </a:p>
+        </p:txBody>
+      </p:sp>
+    </p:spTree>
+  </p:cSld>
+</p:sld>
+</file>
+
+<file path=ppt/slides/slide11.xml><?xml version="1.0" encoding="utf-8"?>
+<p:sld xmlns:a="http://schemas.openxmlformats.org/drawingml/2006/main" xmlns:r="http://schemas.openxmlformats.org/officeDocument/2006/relationships" xmlns:p="http://schemas.openxmlformats.org/presentationml/2006/main">
+  <p:cSld>
+    <p:spTree>
+      <p:nvGrpSpPr>
+        <p:cNvPr id="1" name=""/>
+        <p:cNvGrpSpPr/>
+        <p:nvPr/>
+      </p:nvGrpSpPr>
+      <p:grpSpPr>
+        <a:xfrm>
+          <a:off x="0" y="0"/>
+          <a:ext cx="0" cy="0"/>
+          <a:chOff x="0" y="0"/>
+          <a:chExt cx="0" cy="0"/>
+        </a:xfrm>
+      </p:grpSpPr>
+      <p:sp>
+        <p:nvSpPr>
+          <p:cNvPr id="2" name="Title 1"/>
+          <p:cNvSpPr>
+            <a:spLocks noGrp="1"/>
+          </p:cNvSpPr>
+          <p:nvPr>
+            <p:ph type="title"/>
+          </p:nvPr>
+        </p:nvSpPr>
         <p:spPr>
           <a:xfrm>
             <a:off x="457201" y="204787"/>
@@ -3359,90 +3444,6 @@
 </p:sld>
 </file>
 
-<file path=ppt/slides/slide11.xml><?xml version="1.0" encoding="utf-8"?>
-<p:sld xmlns:a="http://schemas.openxmlformats.org/drawingml/2006/main" xmlns:r="http://schemas.openxmlformats.org/officeDocument/2006/relationships" xmlns:p="http://schemas.openxmlformats.org/presentationml/2006/main">
-  <p:cSld>
-    <p:spTree>
-      <p:nvGrpSpPr>
-        <p:cNvPr id="1" name=""/>
-        <p:cNvGrpSpPr/>
-        <p:nvPr/>
-      </p:nvGrpSpPr>
-      <p:grpSpPr>
-        <a:xfrm>
-          <a:off x="0" y="0"/>
-          <a:ext cx="0" cy="0"/>
-          <a:chOff x="0" y="0"/>
-          <a:chExt cx="0" cy="0"/>
-        </a:xfrm>
-      </p:grpSpPr>
-      <p:sp>
-        <p:nvSpPr>
-          <p:cNvPr id="2" name="Title 1"/>
-          <p:cNvSpPr>
-            <a:spLocks noGrp="1"/>
-          </p:cNvSpPr>
-          <p:nvPr>
-            <p:ph type="title"/>
-          </p:nvPr>
-        </p:nvSpPr>
-        <p:spPr/>
-        <p:txBody>
-          <a:bodyPr/>
-          <a:lstStyle/>
-          <a:p>
-            <a:pPr lvl="0" indent="0" marL="0">
-              <a:buNone/>
-            </a:pPr>
-            <a:r>
-              <a:rPr/>
-              <a:t>Interpreting the test output for monolithic tests</a:t>
-            </a:r>
-          </a:p>
-        </p:txBody>
-      </p:sp>
-      <p:sp>
-        <p:nvSpPr>
-          <p:cNvPr id="3" name="Content Placeholder 2"/>
-          <p:cNvSpPr>
-            <a:spLocks noGrp="1"/>
-          </p:cNvSpPr>
-          <p:nvPr>
-            <p:ph idx="1"/>
-          </p:nvPr>
-        </p:nvSpPr>
-        <p:spPr/>
-        <p:txBody>
-          <a:bodyPr/>
-          <a:lstStyle/>
-          <a:p>
-            <a:pPr lvl="0"/>
-            <a:r>
-              <a:rPr/>
-              <a:t>Since monolithic tests have only a pass/fail result, and there are multiple expected failures, it’s possible to miss failures</a:t>
-            </a:r>
-          </a:p>
-          <a:p>
-            <a:pPr lvl="0"/>
-            <a:r>
-              <a:rPr/>
-              <a:t>This can be mitigated by expecting a certain number of failures, or checking for specific failure messages</a:t>
-            </a:r>
-          </a:p>
-          <a:p>
-            <a:pPr lvl="1"/>
-            <a:r>
-              <a:rPr/>
-              <a:t>This would require updates to the test runner</a:t>
-            </a:r>
-          </a:p>
-        </p:txBody>
-      </p:sp>
-    </p:spTree>
-  </p:cSld>
-</p:sld>
-</file>
-
 <file path=ppt/slides/slide12.xml><?xml version="1.0" encoding="utf-8"?>
 <p:sld xmlns:a="http://schemas.openxmlformats.org/drawingml/2006/main" xmlns:r="http://schemas.openxmlformats.org/officeDocument/2006/relationships" xmlns:p="http://schemas.openxmlformats.org/presentationml/2006/main">
   <p:cSld>
@@ -3480,7 +3481,7 @@
             </a:pPr>
             <a:r>
               <a:rPr/>
-              <a:t>How many tests?</a:t>
+              <a:t>Interpreting the test output for monolithic tests</a:t>
             </a:r>
           </a:p>
         </p:txBody>
@@ -3503,57 +3504,21 @@
             <a:pPr lvl="0"/>
             <a:r>
               <a:rPr/>
-              <a:t>You want to have enough to thoroughly test your dictionary.</a:t>
+              <a:t>Since monolithic tests have only a pass/fail result, and there are multiple expected failures, it’s possible to miss failures</a:t>
+            </a:r>
+          </a:p>
+          <a:p>
+            <a:pPr lvl="0"/>
+            <a:r>
+              <a:rPr/>
+              <a:t>This can be mitigated by expecting a certain number of failures, or checking for specific failure messages</a:t>
             </a:r>
           </a:p>
           <a:p>
             <a:pPr lvl="1"/>
             <a:r>
               <a:rPr/>
-              <a:t>Typically, this means that every class should be used at least once</a:t>
-            </a:r>
-          </a:p>
-          <a:p>
-            <a:pPr lvl="1"/>
-            <a:r>
-              <a:rPr/>
-              <a:t>Every schematron rule should pass and fail at least once, as well.</a:t>
-            </a:r>
-          </a:p>
-          <a:p>
-            <a:pPr lvl="0"/>
-            <a:r>
-              <a:rPr/>
-              <a:t>Too many tests can cause problems (This does </a:t>
-            </a:r>
-            <a:r>
-              <a:rPr i="1"/>
-              <a:t>not</a:t>
-            </a:r>
-            <a:r>
-              <a:rPr/>
-              <a:t> mean don’t write tests)</a:t>
-            </a:r>
-          </a:p>
-          <a:p>
-            <a:pPr lvl="1"/>
-            <a:r>
-              <a:rPr/>
-              <a:t>The biggest problem with too many tests is that they need to be maintained</a:t>
-            </a:r>
-          </a:p>
-          <a:p>
-            <a:pPr lvl="1"/>
-            <a:r>
-              <a:rPr/>
-              <a:t>Maintenance can be necessary when either your dictionary changes, or when the dependencies change (IM changes, upstream dictionaries, etc)</a:t>
-            </a:r>
-          </a:p>
-          <a:p>
-            <a:pPr lvl="1"/>
-            <a:r>
-              <a:rPr/>
-              <a:t>A test should have its own job – it shouldn’t just functionally duplicate another test</a:t>
+              <a:t>This would require updates to the test runner</a:t>
             </a:r>
           </a:p>
         </p:txBody>
@@ -3600,7 +3565,7 @@
             </a:pPr>
             <a:r>
               <a:rPr/>
-              <a:t>Exercise every class</a:t>
+              <a:t>How many tests?</a:t>
             </a:r>
           </a:p>
         </p:txBody>
@@ -3623,14 +3588,57 @@
             <a:pPr lvl="0"/>
             <a:r>
               <a:rPr/>
-              <a:t>At least one passing test should use each class</a:t>
+              <a:t>You want to have enough to thoroughly test your dictionary.</a:t>
+            </a:r>
+          </a:p>
+          <a:p>
+            <a:pPr lvl="1"/>
+            <a:r>
+              <a:rPr/>
+              <a:t>Typically, this means that every class should be used at least once</a:t>
+            </a:r>
+          </a:p>
+          <a:p>
+            <a:pPr lvl="1"/>
+            <a:r>
+              <a:rPr/>
+              <a:t>Every schematron rule should pass and fail at least once, as well.</a:t>
             </a:r>
           </a:p>
           <a:p>
             <a:pPr lvl="0"/>
             <a:r>
               <a:rPr/>
-              <a:t>Write as many test files as necessary to achieve this.</a:t>
+              <a:t>Too many tests can cause problems (This does </a:t>
+            </a:r>
+            <a:r>
+              <a:rPr i="1"/>
+              <a:t>not</a:t>
+            </a:r>
+            <a:r>
+              <a:rPr/>
+              <a:t> mean don’t write tests)</a:t>
+            </a:r>
+          </a:p>
+          <a:p>
+            <a:pPr lvl="1"/>
+            <a:r>
+              <a:rPr/>
+              <a:t>The biggest problem with too many tests is that they need to be maintained</a:t>
+            </a:r>
+          </a:p>
+          <a:p>
+            <a:pPr lvl="1"/>
+            <a:r>
+              <a:rPr/>
+              <a:t>Maintenance can be necessary when either your dictionary changes, or when the dependencies change (IM changes, upstream dictionaries, etc)</a:t>
+            </a:r>
+          </a:p>
+          <a:p>
+            <a:pPr lvl="1"/>
+            <a:r>
+              <a:rPr/>
+              <a:t>A test should have its own job – it shouldn’t just functionally duplicate another test</a:t>
             </a:r>
           </a:p>
         </p:txBody>
@@ -3677,7 +3685,7 @@
             </a:pPr>
             <a:r>
               <a:rPr/>
-              <a:t>Exercise every schematron rule</a:t>
+              <a:t>Exercise every class</a:t>
             </a:r>
           </a:p>
         </p:txBody>
@@ -3700,28 +3708,14 @@
             <a:pPr lvl="0"/>
             <a:r>
               <a:rPr/>
-              <a:t>At least one invalid label test should fail each schematron rule.</a:t>
+              <a:t>At least one passing test should use each class</a:t>
             </a:r>
           </a:p>
           <a:p>
             <a:pPr lvl="0"/>
             <a:r>
               <a:rPr/>
-              <a:t>At least one valid label test should pass each schematron rule</a:t>
-            </a:r>
-          </a:p>
-          <a:p>
-            <a:pPr lvl="0"/>
-            <a:r>
-              <a:rPr/>
-              <a:t>At least one valid label test should not trigger the schematron rule, if possible.</a:t>
-            </a:r>
-          </a:p>
-          <a:p>
-            <a:pPr lvl="0"/>
-            <a:r>
-              <a:rPr/>
-              <a:t>This is especially important, since schematron rules can be prevented from triggering if incorrectly written.</a:t>
+              <a:t>Write as many test files as necessary to achieve this.</a:t>
             </a:r>
           </a:p>
         </p:txBody>
@@ -3732,6 +3726,97 @@
 </file>
 
 <file path=ppt/slides/slide15.xml><?xml version="1.0" encoding="utf-8"?>
+<p:sld xmlns:a="http://schemas.openxmlformats.org/drawingml/2006/main" xmlns:r="http://schemas.openxmlformats.org/officeDocument/2006/relationships" xmlns:p="http://schemas.openxmlformats.org/presentationml/2006/main">
+  <p:cSld>
+    <p:spTree>
+      <p:nvGrpSpPr>
+        <p:cNvPr id="1" name=""/>
+        <p:cNvGrpSpPr/>
+        <p:nvPr/>
+      </p:nvGrpSpPr>
+      <p:grpSpPr>
+        <a:xfrm>
+          <a:off x="0" y="0"/>
+          <a:ext cx="0" cy="0"/>
+          <a:chOff x="0" y="0"/>
+          <a:chExt cx="0" cy="0"/>
+        </a:xfrm>
+      </p:grpSpPr>
+      <p:sp>
+        <p:nvSpPr>
+          <p:cNvPr id="2" name="Title 1"/>
+          <p:cNvSpPr>
+            <a:spLocks noGrp="1"/>
+          </p:cNvSpPr>
+          <p:nvPr>
+            <p:ph type="title"/>
+          </p:nvPr>
+        </p:nvSpPr>
+        <p:spPr/>
+        <p:txBody>
+          <a:bodyPr/>
+          <a:lstStyle/>
+          <a:p>
+            <a:pPr lvl="0" indent="0" marL="0">
+              <a:buNone/>
+            </a:pPr>
+            <a:r>
+              <a:rPr/>
+              <a:t>Exercise every schematron rule</a:t>
+            </a:r>
+          </a:p>
+        </p:txBody>
+      </p:sp>
+      <p:sp>
+        <p:nvSpPr>
+          <p:cNvPr id="3" name="Content Placeholder 2"/>
+          <p:cNvSpPr>
+            <a:spLocks noGrp="1"/>
+          </p:cNvSpPr>
+          <p:nvPr>
+            <p:ph idx="1"/>
+          </p:nvPr>
+        </p:nvSpPr>
+        <p:spPr/>
+        <p:txBody>
+          <a:bodyPr/>
+          <a:lstStyle/>
+          <a:p>
+            <a:pPr lvl="0"/>
+            <a:r>
+              <a:rPr/>
+              <a:t>At least one invalid label test should fail each schematron rule.</a:t>
+            </a:r>
+          </a:p>
+          <a:p>
+            <a:pPr lvl="0"/>
+            <a:r>
+              <a:rPr/>
+              <a:t>At least one valid label test should pass each schematron rule</a:t>
+            </a:r>
+          </a:p>
+          <a:p>
+            <a:pPr lvl="0"/>
+            <a:r>
+              <a:rPr/>
+              <a:t>At least one valid label test should not trigger the schematron rule, if possible.</a:t>
+            </a:r>
+          </a:p>
+          <a:p>
+            <a:pPr lvl="0"/>
+            <a:r>
+              <a:rPr/>
+              <a:t>This is especially important, since schematron rules can be prevented from triggering if incorrectly written.</a:t>
+            </a:r>
+          </a:p>
+        </p:txBody>
+      </p:sp>
+    </p:spTree>
+  </p:cSld>
+</p:sld>
+</file>
+
+<file path=ppt/slides/slide16.xml><?xml version="1.0" encoding="utf-8"?>
 <p:sld xmlns:a="http://schemas.openxmlformats.org/drawingml/2006/main" xmlns:r="http://schemas.openxmlformats.org/officeDocument/2006/relationships" xmlns:p="http://schemas.openxmlformats.org/presentationml/2006/main">
   <p:cSld>
     <p:spTree>
@@ -3889,97 +3974,6 @@
 </p:sld>
 </file>
 
-<file path=ppt/slides/slide16.xml><?xml version="1.0" encoding="utf-8"?>
-<p:sld xmlns:a="http://schemas.openxmlformats.org/drawingml/2006/main" xmlns:r="http://schemas.openxmlformats.org/officeDocument/2006/relationships" xmlns:p="http://schemas.openxmlformats.org/presentationml/2006/main">
-  <p:cSld>
-    <p:spTree>
-      <p:nvGrpSpPr>
-        <p:cNvPr id="1" name=""/>
-        <p:cNvGrpSpPr/>
-        <p:nvPr/>
-      </p:nvGrpSpPr>
-      <p:grpSpPr>
-        <a:xfrm>
-          <a:off x="0" y="0"/>
-          <a:ext cx="0" cy="0"/>
-          <a:chOff x="0" y="0"/>
-          <a:chExt cx="0" cy="0"/>
-        </a:xfrm>
-      </p:grpSpPr>
-      <p:sp>
-        <p:nvSpPr>
-          <p:cNvPr id="2" name="Title 1"/>
-          <p:cNvSpPr>
-            <a:spLocks noGrp="1"/>
-          </p:cNvSpPr>
-          <p:nvPr>
-            <p:ph type="title"/>
-          </p:nvPr>
-        </p:nvSpPr>
-        <p:spPr/>
-        <p:txBody>
-          <a:bodyPr/>
-          <a:lstStyle/>
-          <a:p>
-            <a:pPr lvl="0" indent="0" marL="0">
-              <a:buNone/>
-            </a:pPr>
-            <a:r>
-              <a:rPr/>
-              <a:t>Document the tests</a:t>
-            </a:r>
-          </a:p>
-        </p:txBody>
-      </p:sp>
-      <p:sp>
-        <p:nvSpPr>
-          <p:cNvPr id="3" name="Content Placeholder 2"/>
-          <p:cNvSpPr>
-            <a:spLocks noGrp="1"/>
-          </p:cNvSpPr>
-          <p:nvPr>
-            <p:ph idx="1"/>
-          </p:nvPr>
-        </p:nvSpPr>
-        <p:spPr/>
-        <p:txBody>
-          <a:bodyPr/>
-          <a:lstStyle/>
-          <a:p>
-            <a:pPr lvl="0"/>
-            <a:r>
-              <a:rPr/>
-              <a:t>Documentation can be as simple as a file that lists the test name and what it is testing.</a:t>
-            </a:r>
-          </a:p>
-          <a:p>
-            <a:pPr lvl="0"/>
-            <a:r>
-              <a:rPr/>
-              <a:t>This will remind you how each test is expected to fail, or what each test is intended to exercise.</a:t>
-            </a:r>
-          </a:p>
-          <a:p>
-            <a:pPr lvl="0"/>
-            <a:r>
-              <a:rPr/>
-              <a:t>If writing a monolithic test, this can be further developed into the expected output for comparison in a future version of the EN testing tool.</a:t>
-            </a:r>
-          </a:p>
-          <a:p>
-            <a:pPr lvl="0"/>
-            <a:r>
-              <a:rPr/>
-              <a:t>Documentation can also be written inline. It would be valuable to note precisely which line should fail.</a:t>
-            </a:r>
-          </a:p>
-        </p:txBody>
-      </p:sp>
-    </p:spTree>
-  </p:cSld>
-</p:sld>
-</file>
-
 <file path=ppt/slides/slide17.xml><?xml version="1.0" encoding="utf-8"?>
 <p:sld xmlns:a="http://schemas.openxmlformats.org/drawingml/2006/main" xmlns:r="http://schemas.openxmlformats.org/officeDocument/2006/relationships" xmlns:p="http://schemas.openxmlformats.org/presentationml/2006/main">
   <p:cSld>
@@ -4017,7 +4011,7 @@
             </a:pPr>
             <a:r>
               <a:rPr/>
-              <a:t>Organize the tests</a:t>
+              <a:t>Document the tests</a:t>
             </a:r>
           </a:p>
         </p:txBody>
@@ -4037,12 +4031,31 @@
           <a:bodyPr/>
           <a:lstStyle/>
           <a:p>
-            <a:pPr lvl="0" indent="0" marL="0">
-              <a:buNone/>
-            </a:pPr>
-            <a:r>
-              <a:rPr/>
-              <a:t>At minimum, tests should be organized into valid and invalid label tests. Although this is embedded in the name, sorting them will make it easier to find the test that you need, especially as the number of tests grows.</a:t>
+            <a:pPr lvl="0"/>
+            <a:r>
+              <a:rPr/>
+              <a:t>Documentation can be as simple as a file that lists the test name and what it is testing.</a:t>
+            </a:r>
+          </a:p>
+          <a:p>
+            <a:pPr lvl="0"/>
+            <a:r>
+              <a:rPr/>
+              <a:t>This will remind you how each test is expected to fail, or what each test is intended to exercise.</a:t>
+            </a:r>
+          </a:p>
+          <a:p>
+            <a:pPr lvl="0"/>
+            <a:r>
+              <a:rPr/>
+              <a:t>If writing a monolithic test, this can be further developed into the expected output for comparison in a future version of the EN testing tool.</a:t>
+            </a:r>
+          </a:p>
+          <a:p>
+            <a:pPr lvl="0"/>
+            <a:r>
+              <a:rPr/>
+              <a:t>Documentation can also be written inline. It would be valuable to note precisely which line should fail.</a:t>
             </a:r>
           </a:p>
         </p:txBody>
@@ -4053,6 +4066,78 @@
 </file>
 
 <file path=ppt/slides/slide18.xml><?xml version="1.0" encoding="utf-8"?>
+<p:sld xmlns:a="http://schemas.openxmlformats.org/drawingml/2006/main" xmlns:r="http://schemas.openxmlformats.org/officeDocument/2006/relationships" xmlns:p="http://schemas.openxmlformats.org/presentationml/2006/main">
+  <p:cSld>
+    <p:spTree>
+      <p:nvGrpSpPr>
+        <p:cNvPr id="1" name=""/>
+        <p:cNvGrpSpPr/>
+        <p:nvPr/>
+      </p:nvGrpSpPr>
+      <p:grpSpPr>
+        <a:xfrm>
+          <a:off x="0" y="0"/>
+          <a:ext cx="0" cy="0"/>
+          <a:chOff x="0" y="0"/>
+          <a:chExt cx="0" cy="0"/>
+        </a:xfrm>
+      </p:grpSpPr>
+      <p:sp>
+        <p:nvSpPr>
+          <p:cNvPr id="2" name="Title 1"/>
+          <p:cNvSpPr>
+            <a:spLocks noGrp="1"/>
+          </p:cNvSpPr>
+          <p:nvPr>
+            <p:ph type="title"/>
+          </p:nvPr>
+        </p:nvSpPr>
+        <p:spPr/>
+        <p:txBody>
+          <a:bodyPr/>
+          <a:lstStyle/>
+          <a:p>
+            <a:pPr lvl="0" indent="0" marL="0">
+              <a:buNone/>
+            </a:pPr>
+            <a:r>
+              <a:rPr/>
+              <a:t>Organize the tests</a:t>
+            </a:r>
+          </a:p>
+        </p:txBody>
+      </p:sp>
+      <p:sp>
+        <p:nvSpPr>
+          <p:cNvPr id="3" name="Content Placeholder 2"/>
+          <p:cNvSpPr>
+            <a:spLocks noGrp="1"/>
+          </p:cNvSpPr>
+          <p:nvPr>
+            <p:ph idx="1"/>
+          </p:nvPr>
+        </p:nvSpPr>
+        <p:spPr/>
+        <p:txBody>
+          <a:bodyPr/>
+          <a:lstStyle/>
+          <a:p>
+            <a:pPr lvl="0" indent="0" marL="0">
+              <a:buNone/>
+            </a:pPr>
+            <a:r>
+              <a:rPr/>
+              <a:t>At minimum, tests should be organized into valid and invalid label tests. Although this is embedded in the name, sorting them will make it easier to find the test that you need, especially as the number of tests grows.</a:t>
+            </a:r>
+          </a:p>
+        </p:txBody>
+      </p:sp>
+    </p:spTree>
+  </p:cSld>
+</p:sld>
+</file>
+
+<file path=ppt/slides/slide19.xml><?xml version="1.0" encoding="utf-8"?>
 <p:sld xmlns:a="http://schemas.openxmlformats.org/drawingml/2006/main" xmlns:r="http://schemas.openxmlformats.org/officeDocument/2006/relationships" xmlns:p="http://schemas.openxmlformats.org/presentationml/2006/main">
   <p:cSld>
     <p:spTree>
@@ -4203,7 +4288,98 @@
 </p:sld>
 </file>
 
-<file path=ppt/slides/slide19.xml><?xml version="1.0" encoding="utf-8"?>
+<file path=ppt/slides/slide2.xml><?xml version="1.0" encoding="utf-8"?>
+<p:sld xmlns:a="http://schemas.openxmlformats.org/drawingml/2006/main" xmlns:r="http://schemas.openxmlformats.org/officeDocument/2006/relationships" xmlns:p="http://schemas.openxmlformats.org/presentationml/2006/main">
+  <p:cSld>
+    <p:spTree>
+      <p:nvGrpSpPr>
+        <p:cNvPr id="1" name=""/>
+        <p:cNvGrpSpPr/>
+        <p:nvPr/>
+      </p:nvGrpSpPr>
+      <p:grpSpPr>
+        <a:xfrm>
+          <a:off x="0" y="0"/>
+          <a:ext cx="0" cy="0"/>
+          <a:chOff x="0" y="0"/>
+          <a:chExt cx="0" cy="0"/>
+        </a:xfrm>
+      </p:grpSpPr>
+      <p:sp>
+        <p:nvSpPr>
+          <p:cNvPr id="2" name="Title 1"/>
+          <p:cNvSpPr>
+            <a:spLocks noGrp="1"/>
+          </p:cNvSpPr>
+          <p:nvPr>
+            <p:ph type="title"/>
+          </p:nvPr>
+        </p:nvSpPr>
+        <p:spPr/>
+        <p:txBody>
+          <a:bodyPr/>
+          <a:lstStyle/>
+          <a:p>
+            <a:pPr lvl="0" indent="0" marL="0">
+              <a:buNone/>
+            </a:pPr>
+            <a:r>
+              <a:rPr/>
+              <a:t>What should we keep in mind while writing tests?</a:t>
+            </a:r>
+          </a:p>
+        </p:txBody>
+      </p:sp>
+      <p:sp>
+        <p:nvSpPr>
+          <p:cNvPr id="3" name="Content Placeholder 2"/>
+          <p:cNvSpPr>
+            <a:spLocks noGrp="1"/>
+          </p:cNvSpPr>
+          <p:nvPr>
+            <p:ph idx="1"/>
+          </p:nvPr>
+        </p:nvSpPr>
+        <p:spPr/>
+        <p:txBody>
+          <a:bodyPr/>
+          <a:lstStyle/>
+          <a:p>
+            <a:pPr lvl="0"/>
+            <a:r>
+              <a:rPr/>
+              <a:t>Tests should be maintainable and understandable</a:t>
+            </a:r>
+          </a:p>
+          <a:p>
+            <a:pPr lvl="0"/>
+            <a:r>
+              <a:rPr/>
+              <a:t>Tests should be documented and well organized</a:t>
+            </a:r>
+          </a:p>
+          <a:p>
+            <a:pPr lvl="0"/>
+            <a:r>
+              <a:rPr/>
+              <a:t>Tests should provide good coverage</a:t>
+            </a:r>
+          </a:p>
+          <a:p>
+            <a:pPr lvl="0"/>
+            <a:r>
+              <a:rPr/>
+              <a:t>Tests should communicate the right amount of information</a:t>
+            </a:r>
+          </a:p>
+        </p:txBody>
+      </p:sp>
+    </p:spTree>
+  </p:cSld>
+</p:sld>
+</file>
+
+<file path=ppt/slides/slide20.xml><?xml version="1.0" encoding="utf-8"?>
 <p:sld xmlns:a="http://schemas.openxmlformats.org/drawingml/2006/main" xmlns:r="http://schemas.openxmlformats.org/officeDocument/2006/relationships" xmlns:p="http://schemas.openxmlformats.org/presentationml/2006/main">
   <p:cSld>
     <p:spTree>
@@ -4324,84 +4500,7 @@
 </p:sld>
 </file>
 
-<file path=ppt/slides/slide2.xml><?xml version="1.0" encoding="utf-8"?>
-<p:sld xmlns:a="http://schemas.openxmlformats.org/drawingml/2006/main" xmlns:r="http://schemas.openxmlformats.org/officeDocument/2006/relationships" xmlns:p="http://schemas.openxmlformats.org/presentationml/2006/main">
-  <p:cSld>
-    <p:spTree>
-      <p:nvGrpSpPr>
-        <p:cNvPr id="1" name=""/>
-        <p:cNvGrpSpPr/>
-        <p:nvPr/>
-      </p:nvGrpSpPr>
-      <p:grpSpPr>
-        <a:xfrm>
-          <a:off x="0" y="0"/>
-          <a:ext cx="0" cy="0"/>
-          <a:chOff x="0" y="0"/>
-          <a:chExt cx="0" cy="0"/>
-        </a:xfrm>
-      </p:grpSpPr>
-      <p:sp>
-        <p:nvSpPr>
-          <p:cNvPr id="2" name="Title 1"/>
-          <p:cNvSpPr>
-            <a:spLocks noGrp="1"/>
-          </p:cNvSpPr>
-          <p:nvPr>
-            <p:ph type="title"/>
-          </p:nvPr>
-        </p:nvSpPr>
-        <p:spPr/>
-        <p:txBody>
-          <a:bodyPr/>
-          <a:lstStyle/>
-          <a:p>
-            <a:pPr lvl="0" indent="0" marL="0">
-              <a:buNone/>
-            </a:pPr>
-            <a:r>
-              <a:rPr/>
-              <a:t>Keeping labels uniform</a:t>
-            </a:r>
-          </a:p>
-        </p:txBody>
-      </p:sp>
-      <p:sp>
-        <p:nvSpPr>
-          <p:cNvPr id="3" name="Content Placeholder 2"/>
-          <p:cNvSpPr>
-            <a:spLocks noGrp="1"/>
-          </p:cNvSpPr>
-          <p:nvPr>
-            <p:ph idx="1"/>
-          </p:nvPr>
-        </p:nvSpPr>
-        <p:spPr/>
-        <p:txBody>
-          <a:bodyPr/>
-          <a:lstStyle/>
-          <a:p>
-            <a:pPr lvl="0"/>
-            <a:r>
-              <a:rPr/>
-              <a:t>Unnecessary variations in the label will make it more difficult to track down errors.</a:t>
-            </a:r>
-          </a:p>
-          <a:p>
-            <a:pPr lvl="0"/>
-            <a:r>
-              <a:rPr/>
-              <a:t>Sometimes variations are necessary when a discipline area can apply to different data types</a:t>
-            </a:r>
-          </a:p>
-        </p:txBody>
-      </p:sp>
-    </p:spTree>
-  </p:cSld>
-</p:sld>
-</file>
-
-<file path=ppt/slides/slide20.xml><?xml version="1.0" encoding="utf-8"?>
+<file path=ppt/slides/slide21.xml><?xml version="1.0" encoding="utf-8"?>
 <p:sld xmlns:a="http://schemas.openxmlformats.org/drawingml/2006/main" xmlns:r="http://schemas.openxmlformats.org/officeDocument/2006/relationships" xmlns:p="http://schemas.openxmlformats.org/presentationml/2006/main">
   <p:cSld>
     <p:spTree>
@@ -4559,7 +4658,7 @@
             </a:pPr>
             <a:r>
               <a:rPr/>
-              <a:t>Monolithic tests vs granular tests</a:t>
+              <a:t>Keeping labels uniform</a:t>
             </a:r>
           </a:p>
         </p:txBody>
@@ -4582,14 +4681,14 @@
             <a:pPr lvl="0"/>
             <a:r>
               <a:rPr/>
-              <a:t>EN’s test processes are currently better suited for granular tests</a:t>
+              <a:t>Unnecessary variations in the label will make it more difficult to track down errors.</a:t>
             </a:r>
           </a:p>
           <a:p>
             <a:pPr lvl="0"/>
             <a:r>
               <a:rPr/>
-              <a:t>Monolithic tests are currently easier to generate and maintain</a:t>
+              <a:t>Sometimes variations are necessary when a discipline area can apply to different data types</a:t>
             </a:r>
           </a:p>
         </p:txBody>
@@ -4636,7 +4735,7 @@
             </a:pPr>
             <a:r>
               <a:rPr/>
-              <a:t>Keeping tests granular</a:t>
+              <a:t>Monolithic tests vs granular tests</a:t>
             </a:r>
           </a:p>
         </p:txBody>
@@ -4659,14 +4758,14 @@
             <a:pPr lvl="0"/>
             <a:r>
               <a:rPr/>
-              <a:t>Each label is invalid in only one way</a:t>
+              <a:t>EN’s test processes are currently better suited for granular tests</a:t>
             </a:r>
           </a:p>
           <a:p>
             <a:pPr lvl="0"/>
             <a:r>
               <a:rPr/>
-              <a:t>Combining multiple errors in a single file will mask errors that don’t occur, since the testing framework is binary.</a:t>
+              <a:t>Monolithic tests are currently easier to generate and maintain</a:t>
             </a:r>
           </a:p>
         </p:txBody>
@@ -4713,7 +4812,7 @@
             </a:pPr>
             <a:r>
               <a:rPr/>
-              <a:t>Drawbacks to granular tests</a:t>
+              <a:t>Keeping tests granular</a:t>
             </a:r>
           </a:p>
         </p:txBody>
@@ -4736,14 +4835,14 @@
             <a:pPr lvl="0"/>
             <a:r>
               <a:rPr/>
-              <a:t>Granular tests will increase the number of labels that the LDD is tested against</a:t>
+              <a:t>Each label is invalid in only one way</a:t>
             </a:r>
           </a:p>
           <a:p>
             <a:pPr lvl="0"/>
             <a:r>
               <a:rPr/>
-              <a:t>Each of these labels will need to be maintained individually</a:t>
+              <a:t>Combining multiple errors in a single file will mask errors that don’t occur, since the testing framework is binary.</a:t>
             </a:r>
           </a:p>
         </p:txBody>
@@ -4754,6 +4853,83 @@
 </file>
 
 <file path=ppt/slides/slide6.xml><?xml version="1.0" encoding="utf-8"?>
+<p:sld xmlns:a="http://schemas.openxmlformats.org/drawingml/2006/main" xmlns:r="http://schemas.openxmlformats.org/officeDocument/2006/relationships" xmlns:p="http://schemas.openxmlformats.org/presentationml/2006/main">
+  <p:cSld>
+    <p:spTree>
+      <p:nvGrpSpPr>
+        <p:cNvPr id="1" name=""/>
+        <p:cNvGrpSpPr/>
+        <p:nvPr/>
+      </p:nvGrpSpPr>
+      <p:grpSpPr>
+        <a:xfrm>
+          <a:off x="0" y="0"/>
+          <a:ext cx="0" cy="0"/>
+          <a:chOff x="0" y="0"/>
+          <a:chExt cx="0" cy="0"/>
+        </a:xfrm>
+      </p:grpSpPr>
+      <p:sp>
+        <p:nvSpPr>
+          <p:cNvPr id="2" name="Title 1"/>
+          <p:cNvSpPr>
+            <a:spLocks noGrp="1"/>
+          </p:cNvSpPr>
+          <p:nvPr>
+            <p:ph type="title"/>
+          </p:nvPr>
+        </p:nvSpPr>
+        <p:spPr/>
+        <p:txBody>
+          <a:bodyPr/>
+          <a:lstStyle/>
+          <a:p>
+            <a:pPr lvl="0" indent="0" marL="0">
+              <a:buNone/>
+            </a:pPr>
+            <a:r>
+              <a:rPr/>
+              <a:t>Drawbacks to granular tests</a:t>
+            </a:r>
+          </a:p>
+        </p:txBody>
+      </p:sp>
+      <p:sp>
+        <p:nvSpPr>
+          <p:cNvPr id="3" name="Content Placeholder 2"/>
+          <p:cNvSpPr>
+            <a:spLocks noGrp="1"/>
+          </p:cNvSpPr>
+          <p:nvPr>
+            <p:ph idx="1"/>
+          </p:nvPr>
+        </p:nvSpPr>
+        <p:spPr/>
+        <p:txBody>
+          <a:bodyPr/>
+          <a:lstStyle/>
+          <a:p>
+            <a:pPr lvl="0"/>
+            <a:r>
+              <a:rPr/>
+              <a:t>Granular tests will increase the number of labels that the LDD is tested against</a:t>
+            </a:r>
+          </a:p>
+          <a:p>
+            <a:pPr lvl="0"/>
+            <a:r>
+              <a:rPr/>
+              <a:t>Each of these labels will need to be maintained individually</a:t>
+            </a:r>
+          </a:p>
+        </p:txBody>
+      </p:sp>
+    </p:spTree>
+  </p:cSld>
+</p:sld>
+</file>
+
+<file path=ppt/slides/slide7.xml><?xml version="1.0" encoding="utf-8"?>
 <p:sld xmlns:a="http://schemas.openxmlformats.org/drawingml/2006/main" xmlns:r="http://schemas.openxmlformats.org/officeDocument/2006/relationships" xmlns:p="http://schemas.openxmlformats.org/presentationml/2006/main">
   <p:cSld>
     <p:spTree>
@@ -4911,7 +5087,7 @@
 </p:sld>
 </file>
 
-<file path=ppt/slides/slide7.xml><?xml version="1.0" encoding="utf-8"?>
+<file path=ppt/slides/slide8.xml><?xml version="1.0" encoding="utf-8"?>
 <p:sld xmlns:a="http://schemas.openxmlformats.org/drawingml/2006/main" xmlns:r="http://schemas.openxmlformats.org/officeDocument/2006/relationships" xmlns:p="http://schemas.openxmlformats.org/presentationml/2006/main">
   <p:cSld>
     <p:spTree>
@@ -5017,7 +5193,7 @@
 </p:sld>
 </file>
 
-<file path=ppt/slides/slide8.xml><?xml version="1.0" encoding="utf-8"?>
+<file path=ppt/slides/slide9.xml><?xml version="1.0" encoding="utf-8"?>
 <p:sld xmlns:a="http://schemas.openxmlformats.org/drawingml/2006/main" xmlns:r="http://schemas.openxmlformats.org/officeDocument/2006/relationships" xmlns:p="http://schemas.openxmlformats.org/presentationml/2006/main">
   <p:cSld>
     <p:spTree>
@@ -5173,90 +5349,6 @@
             <a:r>
               <a:rPr/>
               <a:t>generator</a:t>
-            </a:r>
-          </a:p>
-        </p:txBody>
-      </p:sp>
-    </p:spTree>
-  </p:cSld>
-</p:sld>
-</file>
-
-<file path=ppt/slides/slide9.xml><?xml version="1.0" encoding="utf-8"?>
-<p:sld xmlns:a="http://schemas.openxmlformats.org/drawingml/2006/main" xmlns:r="http://schemas.openxmlformats.org/officeDocument/2006/relationships" xmlns:p="http://schemas.openxmlformats.org/presentationml/2006/main">
-  <p:cSld>
-    <p:spTree>
-      <p:nvGrpSpPr>
-        <p:cNvPr id="1" name=""/>
-        <p:cNvGrpSpPr/>
-        <p:nvPr/>
-      </p:nvGrpSpPr>
-      <p:grpSpPr>
-        <a:xfrm>
-          <a:off x="0" y="0"/>
-          <a:ext cx="0" cy="0"/>
-          <a:chOff x="0" y="0"/>
-          <a:chExt cx="0" cy="0"/>
-        </a:xfrm>
-      </p:grpSpPr>
-      <p:sp>
-        <p:nvSpPr>
-          <p:cNvPr id="2" name="Title 1"/>
-          <p:cNvSpPr>
-            <a:spLocks noGrp="1"/>
-          </p:cNvSpPr>
-          <p:nvPr>
-            <p:ph type="title"/>
-          </p:nvPr>
-        </p:nvSpPr>
-        <p:spPr/>
-        <p:txBody>
-          <a:bodyPr/>
-          <a:lstStyle/>
-          <a:p>
-            <a:pPr lvl="0" indent="0" marL="0">
-              <a:buNone/>
-            </a:pPr>
-            <a:r>
-              <a:rPr/>
-              <a:t>Monolithic tests</a:t>
-            </a:r>
-          </a:p>
-        </p:txBody>
-      </p:sp>
-      <p:sp>
-        <p:nvSpPr>
-          <p:cNvPr id="3" name="Content Placeholder 2"/>
-          <p:cNvSpPr>
-            <a:spLocks noGrp="1"/>
-          </p:cNvSpPr>
-          <p:nvPr>
-            <p:ph idx="1"/>
-          </p:nvPr>
-        </p:nvSpPr>
-        <p:spPr/>
-        <p:txBody>
-          <a:bodyPr/>
-          <a:lstStyle/>
-          <a:p>
-            <a:pPr lvl="0"/>
-            <a:r>
-              <a:rPr/>
-              <a:t>Multiple tests can be packed into a single label</a:t>
-            </a:r>
-          </a:p>
-          <a:p>
-            <a:pPr lvl="0"/>
-            <a:r>
-              <a:rPr/>
-              <a:t>Document each point where the test is expected to fail</a:t>
-            </a:r>
-          </a:p>
-          <a:p>
-            <a:pPr lvl="0"/>
-            <a:r>
-              <a:rPr/>
-              <a:t>Examine the output of the test run to determine if there are any missed failures</a:t>
             </a:r>
           </a:p>
         </p:txBody>

</xml_diff>

<commit_message>
Split the test coverage and documentation slides
</commit_message>
<xml_diff>
--- a/LDDTesting/stone-LDDTestingTechniques.pptx
+++ b/LDDTesting/stone-LDDTestingTechniques.pptx
@@ -26,6 +26,8 @@
     <p:sldId id="274" r:id="rId20"/>
     <p:sldId id="275" r:id="rId21"/>
     <p:sldId id="276" r:id="rId22"/>
+    <p:sldId id="277" r:id="rId23"/>
+    <p:sldId id="278" r:id="rId24"/>
   </p:sldIdLst>
   <p:sldSz cx="9144000" cy="5143500" type="screen16x9"/>
   <p:notesSz cx="6858000" cy="9144000"/>
@@ -3605,42 +3607,6 @@
               <a:t>Every schematron rule should pass and fail at least once, as well.</a:t>
             </a:r>
           </a:p>
-          <a:p>
-            <a:pPr lvl="0"/>
-            <a:r>
-              <a:rPr/>
-              <a:t>Too many tests can cause problems (This does </a:t>
-            </a:r>
-            <a:r>
-              <a:rPr i="1"/>
-              <a:t>not</a:t>
-            </a:r>
-            <a:r>
-              <a:rPr/>
-              <a:t> mean don’t write tests)</a:t>
-            </a:r>
-          </a:p>
-          <a:p>
-            <a:pPr lvl="1"/>
-            <a:r>
-              <a:rPr/>
-              <a:t>The biggest problem with too many tests is that they need to be maintained</a:t>
-            </a:r>
-          </a:p>
-          <a:p>
-            <a:pPr lvl="1"/>
-            <a:r>
-              <a:rPr/>
-              <a:t>Maintenance can be necessary when either your dictionary changes, or when the dependencies change (IM changes, upstream dictionaries, etc)</a:t>
-            </a:r>
-          </a:p>
-          <a:p>
-            <a:pPr lvl="1"/>
-            <a:r>
-              <a:rPr/>
-              <a:t>A test should have its own job – it shouldn’t just functionally duplicate another test</a:t>
-            </a:r>
-          </a:p>
         </p:txBody>
       </p:sp>
     </p:spTree>
@@ -3685,7 +3651,7 @@
             </a:pPr>
             <a:r>
               <a:rPr/>
-              <a:t>Exercise every class</a:t>
+              <a:t>The case against too many tests</a:t>
             </a:r>
           </a:p>
         </p:txBody>
@@ -3708,14 +3674,36 @@
             <a:pPr lvl="0"/>
             <a:r>
               <a:rPr/>
-              <a:t>At least one passing test should use each class</a:t>
-            </a:r>
-          </a:p>
-          <a:p>
-            <a:pPr lvl="0"/>
-            <a:r>
-              <a:rPr/>
-              <a:t>Write as many test files as necessary to achieve this.</a:t>
+              <a:t>Too many tests can cause problems (This does </a:t>
+            </a:r>
+            <a:r>
+              <a:rPr i="1"/>
+              <a:t>not</a:t>
+            </a:r>
+            <a:r>
+              <a:rPr/>
+              <a:t> mean don’t write tests)</a:t>
+            </a:r>
+          </a:p>
+          <a:p>
+            <a:pPr lvl="1"/>
+            <a:r>
+              <a:rPr/>
+              <a:t>The biggest problem with too many tests is that they need to be maintained</a:t>
+            </a:r>
+          </a:p>
+          <a:p>
+            <a:pPr lvl="1"/>
+            <a:r>
+              <a:rPr/>
+              <a:t>Maintenance can be necessary when either your dictionary changes, or when the dependencies change (IM changes, upstream dictionaries, etc)</a:t>
+            </a:r>
+          </a:p>
+          <a:p>
+            <a:pPr lvl="1"/>
+            <a:r>
+              <a:rPr/>
+              <a:t>A test should have its own job – it shouldn’t just functionally duplicate another test</a:t>
             </a:r>
           </a:p>
         </p:txBody>
@@ -3762,7 +3750,7 @@
             </a:pPr>
             <a:r>
               <a:rPr/>
-              <a:t>Exercise every schematron rule</a:t>
+              <a:t>Exercise every class</a:t>
             </a:r>
           </a:p>
         </p:txBody>
@@ -3785,28 +3773,14 @@
             <a:pPr lvl="0"/>
             <a:r>
               <a:rPr/>
-              <a:t>At least one invalid label test should fail each schematron rule.</a:t>
+              <a:t>At least one passing test should use each class</a:t>
             </a:r>
           </a:p>
           <a:p>
             <a:pPr lvl="0"/>
             <a:r>
               <a:rPr/>
-              <a:t>At least one valid label test should pass each schematron rule</a:t>
-            </a:r>
-          </a:p>
-          <a:p>
-            <a:pPr lvl="0"/>
-            <a:r>
-              <a:rPr/>
-              <a:t>At least one valid label test should not trigger the schematron rule, if possible.</a:t>
-            </a:r>
-          </a:p>
-          <a:p>
-            <a:pPr lvl="0"/>
-            <a:r>
-              <a:rPr/>
-              <a:t>This is especially important, since schematron rules can be prevented from triggering if incorrectly written.</a:t>
+              <a:t>Write as many test files as necessary to achieve this.</a:t>
             </a:r>
           </a:p>
         </p:txBody>
@@ -3817,6 +3791,97 @@
 </file>
 
 <file path=ppt/slides/slide16.xml><?xml version="1.0" encoding="utf-8"?>
+<p:sld xmlns:a="http://schemas.openxmlformats.org/drawingml/2006/main" xmlns:r="http://schemas.openxmlformats.org/officeDocument/2006/relationships" xmlns:p="http://schemas.openxmlformats.org/presentationml/2006/main">
+  <p:cSld>
+    <p:spTree>
+      <p:nvGrpSpPr>
+        <p:cNvPr id="1" name=""/>
+        <p:cNvGrpSpPr/>
+        <p:nvPr/>
+      </p:nvGrpSpPr>
+      <p:grpSpPr>
+        <a:xfrm>
+          <a:off x="0" y="0"/>
+          <a:ext cx="0" cy="0"/>
+          <a:chOff x="0" y="0"/>
+          <a:chExt cx="0" cy="0"/>
+        </a:xfrm>
+      </p:grpSpPr>
+      <p:sp>
+        <p:nvSpPr>
+          <p:cNvPr id="2" name="Title 1"/>
+          <p:cNvSpPr>
+            <a:spLocks noGrp="1"/>
+          </p:cNvSpPr>
+          <p:nvPr>
+            <p:ph type="title"/>
+          </p:nvPr>
+        </p:nvSpPr>
+        <p:spPr/>
+        <p:txBody>
+          <a:bodyPr/>
+          <a:lstStyle/>
+          <a:p>
+            <a:pPr lvl="0" indent="0" marL="0">
+              <a:buNone/>
+            </a:pPr>
+            <a:r>
+              <a:rPr/>
+              <a:t>Exercise every schematron rule</a:t>
+            </a:r>
+          </a:p>
+        </p:txBody>
+      </p:sp>
+      <p:sp>
+        <p:nvSpPr>
+          <p:cNvPr id="3" name="Content Placeholder 2"/>
+          <p:cNvSpPr>
+            <a:spLocks noGrp="1"/>
+          </p:cNvSpPr>
+          <p:nvPr>
+            <p:ph idx="1"/>
+          </p:nvPr>
+        </p:nvSpPr>
+        <p:spPr/>
+        <p:txBody>
+          <a:bodyPr/>
+          <a:lstStyle/>
+          <a:p>
+            <a:pPr lvl="0"/>
+            <a:r>
+              <a:rPr/>
+              <a:t>At least one invalid label test should fail each schematron rule.</a:t>
+            </a:r>
+          </a:p>
+          <a:p>
+            <a:pPr lvl="0"/>
+            <a:r>
+              <a:rPr/>
+              <a:t>At least one valid label test should pass each schematron rule</a:t>
+            </a:r>
+          </a:p>
+          <a:p>
+            <a:pPr lvl="0"/>
+            <a:r>
+              <a:rPr/>
+              <a:t>At least one valid label test should not trigger the schematron rule, if possible.</a:t>
+            </a:r>
+          </a:p>
+          <a:p>
+            <a:pPr lvl="0"/>
+            <a:r>
+              <a:rPr/>
+              <a:t>This is especially important, since schematron rules can be prevented from triggering if incorrectly written.</a:t>
+            </a:r>
+          </a:p>
+        </p:txBody>
+      </p:sp>
+    </p:spTree>
+  </p:cSld>
+</p:sld>
+</file>
+
+<file path=ppt/slides/slide17.xml><?xml version="1.0" encoding="utf-8"?>
 <p:sld xmlns:a="http://schemas.openxmlformats.org/drawingml/2006/main" xmlns:r="http://schemas.openxmlformats.org/officeDocument/2006/relationships" xmlns:p="http://schemas.openxmlformats.org/presentationml/2006/main">
   <p:cSld>
     <p:spTree>
@@ -3974,97 +4039,6 @@
 </p:sld>
 </file>
 
-<file path=ppt/slides/slide17.xml><?xml version="1.0" encoding="utf-8"?>
-<p:sld xmlns:a="http://schemas.openxmlformats.org/drawingml/2006/main" xmlns:r="http://schemas.openxmlformats.org/officeDocument/2006/relationships" xmlns:p="http://schemas.openxmlformats.org/presentationml/2006/main">
-  <p:cSld>
-    <p:spTree>
-      <p:nvGrpSpPr>
-        <p:cNvPr id="1" name=""/>
-        <p:cNvGrpSpPr/>
-        <p:nvPr/>
-      </p:nvGrpSpPr>
-      <p:grpSpPr>
-        <a:xfrm>
-          <a:off x="0" y="0"/>
-          <a:ext cx="0" cy="0"/>
-          <a:chOff x="0" y="0"/>
-          <a:chExt cx="0" cy="0"/>
-        </a:xfrm>
-      </p:grpSpPr>
-      <p:sp>
-        <p:nvSpPr>
-          <p:cNvPr id="2" name="Title 1"/>
-          <p:cNvSpPr>
-            <a:spLocks noGrp="1"/>
-          </p:cNvSpPr>
-          <p:nvPr>
-            <p:ph type="title"/>
-          </p:nvPr>
-        </p:nvSpPr>
-        <p:spPr/>
-        <p:txBody>
-          <a:bodyPr/>
-          <a:lstStyle/>
-          <a:p>
-            <a:pPr lvl="0" indent="0" marL="0">
-              <a:buNone/>
-            </a:pPr>
-            <a:r>
-              <a:rPr/>
-              <a:t>Document the tests</a:t>
-            </a:r>
-          </a:p>
-        </p:txBody>
-      </p:sp>
-      <p:sp>
-        <p:nvSpPr>
-          <p:cNvPr id="3" name="Content Placeholder 2"/>
-          <p:cNvSpPr>
-            <a:spLocks noGrp="1"/>
-          </p:cNvSpPr>
-          <p:nvPr>
-            <p:ph idx="1"/>
-          </p:nvPr>
-        </p:nvSpPr>
-        <p:spPr/>
-        <p:txBody>
-          <a:bodyPr/>
-          <a:lstStyle/>
-          <a:p>
-            <a:pPr lvl="0"/>
-            <a:r>
-              <a:rPr/>
-              <a:t>Documentation can be as simple as a file that lists the test name and what it is testing.</a:t>
-            </a:r>
-          </a:p>
-          <a:p>
-            <a:pPr lvl="0"/>
-            <a:r>
-              <a:rPr/>
-              <a:t>This will remind you how each test is expected to fail, or what each test is intended to exercise.</a:t>
-            </a:r>
-          </a:p>
-          <a:p>
-            <a:pPr lvl="0"/>
-            <a:r>
-              <a:rPr/>
-              <a:t>If writing a monolithic test, this can be further developed into the expected output for comparison in a future version of the EN testing tool.</a:t>
-            </a:r>
-          </a:p>
-          <a:p>
-            <a:pPr lvl="0"/>
-            <a:r>
-              <a:rPr/>
-              <a:t>Documentation can also be written inline. It would be valuable to note precisely which line should fail.</a:t>
-            </a:r>
-          </a:p>
-        </p:txBody>
-      </p:sp>
-    </p:spTree>
-  </p:cSld>
-</p:sld>
-</file>
-
 <file path=ppt/slides/slide18.xml><?xml version="1.0" encoding="utf-8"?>
 <p:sld xmlns:a="http://schemas.openxmlformats.org/drawingml/2006/main" xmlns:r="http://schemas.openxmlformats.org/officeDocument/2006/relationships" xmlns:p="http://schemas.openxmlformats.org/presentationml/2006/main">
   <p:cSld>
@@ -4102,7 +4076,7 @@
             </a:pPr>
             <a:r>
               <a:rPr/>
-              <a:t>Organize the tests</a:t>
+              <a:t>Document the tests - What to document and why</a:t>
             </a:r>
           </a:p>
         </p:txBody>
@@ -4122,12 +4096,24 @@
           <a:bodyPr/>
           <a:lstStyle/>
           <a:p>
-            <a:pPr lvl="0" indent="0" marL="0">
-              <a:buNone/>
-            </a:pPr>
-            <a:r>
-              <a:rPr/>
-              <a:t>At minimum, tests should be organized into valid and invalid label tests. Although this is embedded in the name, sorting them will make it easier to find the test that you need, especially as the number of tests grows.</a:t>
+            <a:pPr lvl="0"/>
+            <a:r>
+              <a:rPr/>
+              <a:t>Each test should somehow document what is being tested.</a:t>
+            </a:r>
+          </a:p>
+          <a:p>
+            <a:pPr lvl="0"/>
+            <a:r>
+              <a:rPr/>
+              <a:t>This will remind you how each test is expected to fail, or what each test is intended to exercise.</a:t>
+            </a:r>
+          </a:p>
+          <a:p>
+            <a:pPr lvl="0"/>
+            <a:r>
+              <a:rPr/>
+              <a:t>If writing a monolithic test, this can be further developed into the expected output for comparison in a future version of the EN testing tool.</a:t>
             </a:r>
           </a:p>
         </p:txBody>
@@ -4138,6 +4124,246 @@
 </file>
 
 <file path=ppt/slides/slide19.xml><?xml version="1.0" encoding="utf-8"?>
+<p:sld xmlns:a="http://schemas.openxmlformats.org/drawingml/2006/main" xmlns:r="http://schemas.openxmlformats.org/officeDocument/2006/relationships" xmlns:p="http://schemas.openxmlformats.org/presentationml/2006/main">
+  <p:cSld>
+    <p:spTree>
+      <p:nvGrpSpPr>
+        <p:cNvPr id="1" name=""/>
+        <p:cNvGrpSpPr/>
+        <p:nvPr/>
+      </p:nvGrpSpPr>
+      <p:grpSpPr>
+        <a:xfrm>
+          <a:off x="0" y="0"/>
+          <a:ext cx="0" cy="0"/>
+          <a:chOff x="0" y="0"/>
+          <a:chExt cx="0" cy="0"/>
+        </a:xfrm>
+      </p:grpSpPr>
+      <p:sp>
+        <p:nvSpPr>
+          <p:cNvPr id="2" name="Title 1"/>
+          <p:cNvSpPr>
+            <a:spLocks noGrp="1"/>
+          </p:cNvSpPr>
+          <p:nvPr>
+            <p:ph type="title"/>
+          </p:nvPr>
+        </p:nvSpPr>
+        <p:spPr/>
+        <p:txBody>
+          <a:bodyPr/>
+          <a:lstStyle/>
+          <a:p>
+            <a:pPr lvl="0" indent="0" marL="0">
+              <a:buNone/>
+            </a:pPr>
+            <a:r>
+              <a:rPr/>
+              <a:t>Document the tests - What to document and why</a:t>
+            </a:r>
+          </a:p>
+        </p:txBody>
+      </p:sp>
+      <p:sp>
+        <p:nvSpPr>
+          <p:cNvPr id="3" name="Content Placeholder 2"/>
+          <p:cNvSpPr>
+            <a:spLocks noGrp="1"/>
+          </p:cNvSpPr>
+          <p:nvPr>
+            <p:ph idx="1"/>
+          </p:nvPr>
+        </p:nvSpPr>
+        <p:spPr/>
+        <p:txBody>
+          <a:bodyPr/>
+          <a:lstStyle/>
+          <a:p>
+            <a:pPr lvl="0"/>
+            <a:r>
+              <a:rPr/>
+              <a:t>Documentation can be as simple as a file that lists the test name and what it is testing.</a:t>
+            </a:r>
+          </a:p>
+          <a:p>
+            <a:pPr lvl="0"/>
+            <a:r>
+              <a:rPr/>
+              <a:t>Documentation can also be written inline. It would be valuable to note precisely which line should fail.</a:t>
+            </a:r>
+          </a:p>
+        </p:txBody>
+      </p:sp>
+    </p:spTree>
+  </p:cSld>
+</p:sld>
+</file>
+
+<file path=ppt/slides/slide2.xml><?xml version="1.0" encoding="utf-8"?>
+<p:sld xmlns:a="http://schemas.openxmlformats.org/drawingml/2006/main" xmlns:r="http://schemas.openxmlformats.org/officeDocument/2006/relationships" xmlns:p="http://schemas.openxmlformats.org/presentationml/2006/main">
+  <p:cSld>
+    <p:spTree>
+      <p:nvGrpSpPr>
+        <p:cNvPr id="1" name=""/>
+        <p:cNvGrpSpPr/>
+        <p:nvPr/>
+      </p:nvGrpSpPr>
+      <p:grpSpPr>
+        <a:xfrm>
+          <a:off x="0" y="0"/>
+          <a:ext cx="0" cy="0"/>
+          <a:chOff x="0" y="0"/>
+          <a:chExt cx="0" cy="0"/>
+        </a:xfrm>
+      </p:grpSpPr>
+      <p:sp>
+        <p:nvSpPr>
+          <p:cNvPr id="2" name="Title 1"/>
+          <p:cNvSpPr>
+            <a:spLocks noGrp="1"/>
+          </p:cNvSpPr>
+          <p:nvPr>
+            <p:ph type="title"/>
+          </p:nvPr>
+        </p:nvSpPr>
+        <p:spPr/>
+        <p:txBody>
+          <a:bodyPr/>
+          <a:lstStyle/>
+          <a:p>
+            <a:pPr lvl="0" indent="0" marL="0">
+              <a:buNone/>
+            </a:pPr>
+            <a:r>
+              <a:rPr/>
+              <a:t>What should we keep in mind while writing tests?</a:t>
+            </a:r>
+          </a:p>
+        </p:txBody>
+      </p:sp>
+      <p:sp>
+        <p:nvSpPr>
+          <p:cNvPr id="3" name="Content Placeholder 2"/>
+          <p:cNvSpPr>
+            <a:spLocks noGrp="1"/>
+          </p:cNvSpPr>
+          <p:nvPr>
+            <p:ph idx="1"/>
+          </p:nvPr>
+        </p:nvSpPr>
+        <p:spPr/>
+        <p:txBody>
+          <a:bodyPr/>
+          <a:lstStyle/>
+          <a:p>
+            <a:pPr lvl="0"/>
+            <a:r>
+              <a:rPr/>
+              <a:t>Tests should be maintainable and understandable</a:t>
+            </a:r>
+          </a:p>
+          <a:p>
+            <a:pPr lvl="0"/>
+            <a:r>
+              <a:rPr/>
+              <a:t>Tests should be documented and well organized</a:t>
+            </a:r>
+          </a:p>
+          <a:p>
+            <a:pPr lvl="0"/>
+            <a:r>
+              <a:rPr/>
+              <a:t>Tests should provide good coverage</a:t>
+            </a:r>
+          </a:p>
+          <a:p>
+            <a:pPr lvl="0"/>
+            <a:r>
+              <a:rPr/>
+              <a:t>Tests should communicate the right amount of information</a:t>
+            </a:r>
+          </a:p>
+        </p:txBody>
+      </p:sp>
+    </p:spTree>
+  </p:cSld>
+</p:sld>
+</file>
+
+<file path=ppt/slides/slide20.xml><?xml version="1.0" encoding="utf-8"?>
+<p:sld xmlns:a="http://schemas.openxmlformats.org/drawingml/2006/main" xmlns:r="http://schemas.openxmlformats.org/officeDocument/2006/relationships" xmlns:p="http://schemas.openxmlformats.org/presentationml/2006/main">
+  <p:cSld>
+    <p:spTree>
+      <p:nvGrpSpPr>
+        <p:cNvPr id="1" name=""/>
+        <p:cNvGrpSpPr/>
+        <p:nvPr/>
+      </p:nvGrpSpPr>
+      <p:grpSpPr>
+        <a:xfrm>
+          <a:off x="0" y="0"/>
+          <a:ext cx="0" cy="0"/>
+          <a:chOff x="0" y="0"/>
+          <a:chExt cx="0" cy="0"/>
+        </a:xfrm>
+      </p:grpSpPr>
+      <p:sp>
+        <p:nvSpPr>
+          <p:cNvPr id="2" name="Title 1"/>
+          <p:cNvSpPr>
+            <a:spLocks noGrp="1"/>
+          </p:cNvSpPr>
+          <p:nvPr>
+            <p:ph type="title"/>
+          </p:nvPr>
+        </p:nvSpPr>
+        <p:spPr/>
+        <p:txBody>
+          <a:bodyPr/>
+          <a:lstStyle/>
+          <a:p>
+            <a:pPr lvl="0" indent="0" marL="0">
+              <a:buNone/>
+            </a:pPr>
+            <a:r>
+              <a:rPr/>
+              <a:t>Organize the tests</a:t>
+            </a:r>
+          </a:p>
+        </p:txBody>
+      </p:sp>
+      <p:sp>
+        <p:nvSpPr>
+          <p:cNvPr id="3" name="Content Placeholder 2"/>
+          <p:cNvSpPr>
+            <a:spLocks noGrp="1"/>
+          </p:cNvSpPr>
+          <p:nvPr>
+            <p:ph idx="1"/>
+          </p:nvPr>
+        </p:nvSpPr>
+        <p:spPr/>
+        <p:txBody>
+          <a:bodyPr/>
+          <a:lstStyle/>
+          <a:p>
+            <a:pPr lvl="0" indent="0" marL="0">
+              <a:buNone/>
+            </a:pPr>
+            <a:r>
+              <a:rPr/>
+              <a:t>At minimum, tests should be organized into valid and invalid label tests. Although this is embedded in the name, sorting them will make it easier to find the test that you need, especially as the number of tests grows.</a:t>
+            </a:r>
+          </a:p>
+        </p:txBody>
+      </p:sp>
+    </p:spTree>
+  </p:cSld>
+</p:sld>
+</file>
+
+<file path=ppt/slides/slide21.xml><?xml version="1.0" encoding="utf-8"?>
 <p:sld xmlns:a="http://schemas.openxmlformats.org/drawingml/2006/main" xmlns:r="http://schemas.openxmlformats.org/officeDocument/2006/relationships" xmlns:p="http://schemas.openxmlformats.org/presentationml/2006/main">
   <p:cSld>
     <p:spTree>
@@ -4288,98 +4514,7 @@
 </p:sld>
 </file>
 
-<file path=ppt/slides/slide2.xml><?xml version="1.0" encoding="utf-8"?>
-<p:sld xmlns:a="http://schemas.openxmlformats.org/drawingml/2006/main" xmlns:r="http://schemas.openxmlformats.org/officeDocument/2006/relationships" xmlns:p="http://schemas.openxmlformats.org/presentationml/2006/main">
-  <p:cSld>
-    <p:spTree>
-      <p:nvGrpSpPr>
-        <p:cNvPr id="1" name=""/>
-        <p:cNvGrpSpPr/>
-        <p:nvPr/>
-      </p:nvGrpSpPr>
-      <p:grpSpPr>
-        <a:xfrm>
-          <a:off x="0" y="0"/>
-          <a:ext cx="0" cy="0"/>
-          <a:chOff x="0" y="0"/>
-          <a:chExt cx="0" cy="0"/>
-        </a:xfrm>
-      </p:grpSpPr>
-      <p:sp>
-        <p:nvSpPr>
-          <p:cNvPr id="2" name="Title 1"/>
-          <p:cNvSpPr>
-            <a:spLocks noGrp="1"/>
-          </p:cNvSpPr>
-          <p:nvPr>
-            <p:ph type="title"/>
-          </p:nvPr>
-        </p:nvSpPr>
-        <p:spPr/>
-        <p:txBody>
-          <a:bodyPr/>
-          <a:lstStyle/>
-          <a:p>
-            <a:pPr lvl="0" indent="0" marL="0">
-              <a:buNone/>
-            </a:pPr>
-            <a:r>
-              <a:rPr/>
-              <a:t>What should we keep in mind while writing tests?</a:t>
-            </a:r>
-          </a:p>
-        </p:txBody>
-      </p:sp>
-      <p:sp>
-        <p:nvSpPr>
-          <p:cNvPr id="3" name="Content Placeholder 2"/>
-          <p:cNvSpPr>
-            <a:spLocks noGrp="1"/>
-          </p:cNvSpPr>
-          <p:nvPr>
-            <p:ph idx="1"/>
-          </p:nvPr>
-        </p:nvSpPr>
-        <p:spPr/>
-        <p:txBody>
-          <a:bodyPr/>
-          <a:lstStyle/>
-          <a:p>
-            <a:pPr lvl="0"/>
-            <a:r>
-              <a:rPr/>
-              <a:t>Tests should be maintainable and understandable</a:t>
-            </a:r>
-          </a:p>
-          <a:p>
-            <a:pPr lvl="0"/>
-            <a:r>
-              <a:rPr/>
-              <a:t>Tests should be documented and well organized</a:t>
-            </a:r>
-          </a:p>
-          <a:p>
-            <a:pPr lvl="0"/>
-            <a:r>
-              <a:rPr/>
-              <a:t>Tests should provide good coverage</a:t>
-            </a:r>
-          </a:p>
-          <a:p>
-            <a:pPr lvl="0"/>
-            <a:r>
-              <a:rPr/>
-              <a:t>Tests should communicate the right amount of information</a:t>
-            </a:r>
-          </a:p>
-        </p:txBody>
-      </p:sp>
-    </p:spTree>
-  </p:cSld>
-</p:sld>
-</file>
-
-<file path=ppt/slides/slide20.xml><?xml version="1.0" encoding="utf-8"?>
+<file path=ppt/slides/slide22.xml><?xml version="1.0" encoding="utf-8"?>
 <p:sld xmlns:a="http://schemas.openxmlformats.org/drawingml/2006/main" xmlns:r="http://schemas.openxmlformats.org/officeDocument/2006/relationships" xmlns:p="http://schemas.openxmlformats.org/presentationml/2006/main">
   <p:cSld>
     <p:spTree>
@@ -4500,7 +4635,7 @@
 </p:sld>
 </file>
 
-<file path=ppt/slides/slide21.xml><?xml version="1.0" encoding="utf-8"?>
+<file path=ppt/slides/slide23.xml><?xml version="1.0" encoding="utf-8"?>
 <p:sld xmlns:a="http://schemas.openxmlformats.org/drawingml/2006/main" xmlns:r="http://schemas.openxmlformats.org/officeDocument/2006/relationships" xmlns:p="http://schemas.openxmlformats.org/presentationml/2006/main">
   <p:cSld>
     <p:spTree>

</xml_diff>

<commit_message>
Addded additional information for each existing dictionary demo
</commit_message>
<xml_diff>
--- a/LDDTesting/stone-LDDTestingTechniques.pptx
+++ b/LDDTesting/stone-LDDTestingTechniques.pptx
@@ -3379,6 +3379,34 @@
               <a:t>Demonstrate monolithic tests</a:t>
             </a:r>
           </a:p>
+          <a:p>
+            <a:pPr lvl="0"/>
+            <a:r>
+              <a:rPr/>
+              <a:t>The tests in the spectral dictionary have more than than one error introduced.</a:t>
+            </a:r>
+          </a:p>
+          <a:p>
+            <a:pPr lvl="0"/>
+            <a:r>
+              <a:rPr/>
+              <a:t>The errors are documented within the file.</a:t>
+            </a:r>
+          </a:p>
+          <a:p>
+            <a:pPr lvl="0"/>
+            <a:r>
+              <a:rPr/>
+              <a:t>This reduces the number of tests that need to be written.</a:t>
+            </a:r>
+          </a:p>
+          <a:p>
+            <a:pPr lvl="0"/>
+            <a:r>
+              <a:rPr/>
+              <a:t>Additional processing beyond the current testing framework is needed to interpret the errors.</a:t>
+            </a:r>
+          </a:p>
         </p:txBody>
       </p:sp>
       <p:pic>
@@ -3520,7 +3548,7 @@
             <a:pPr lvl="1"/>
             <a:r>
               <a:rPr/>
-              <a:t>This would require updates to the test runner</a:t>
+              <a:t>This would require updates to the testing framework</a:t>
             </a:r>
           </a:p>
         </p:txBody>
@@ -3970,6 +3998,34 @@
             <a:r>
               <a:rPr/>
               <a:t>Demonstrate tests for each schematron rule</a:t>
+            </a:r>
+          </a:p>
+          <a:p>
+            <a:pPr lvl="0"/>
+            <a:r>
+              <a:rPr/>
+              <a:t>Each schematron rule in the nucspec dictionary has a corresponding test that fails the rule.</a:t>
+            </a:r>
+          </a:p>
+          <a:p>
+            <a:pPr lvl="1"/>
+            <a:r>
+              <a:rPr/>
+              <a:t>Additional tests could be written to illustrate cases that pass each rule.</a:t>
+            </a:r>
+          </a:p>
+          <a:p>
+            <a:pPr lvl="1"/>
+            <a:r>
+              <a:rPr/>
+              <a:t>Cases could also be written to illustrate cases where the rule does not apply.</a:t>
+            </a:r>
+          </a:p>
+          <a:p>
+            <a:pPr lvl="0"/>
+            <a:r>
+              <a:rPr/>
+              <a:t>There are multiple passing labels, which collectively exercise a variety of classes within the dictionary.</a:t>
             </a:r>
           </a:p>
         </p:txBody>
@@ -4893,7 +4949,7 @@
             <a:pPr lvl="0"/>
             <a:r>
               <a:rPr/>
-              <a:t>EN’s test processes are currently better suited for granular tests</a:t>
+              <a:t>The testing framework that we are using is better suited for granular tests</a:t>
             </a:r>
           </a:p>
           <a:p>
@@ -4977,7 +5033,7 @@
             <a:pPr lvl="0"/>
             <a:r>
               <a:rPr/>
-              <a:t>Combining multiple errors in a single file will mask errors that don’t occur, since the testing framework is binary.</a:t>
+              <a:t>Combining multiple errors in a single file will mask errors that don’t occur, since the testing framework only knows if a label passed of failed.</a:t>
             </a:r>
           </a:p>
         </p:txBody>
@@ -5153,6 +5209,20 @@
             <a:r>
               <a:rPr/>
               <a:t>Demonstrate granular tests</a:t>
+            </a:r>
+          </a:p>
+          <a:p>
+            <a:pPr lvl="0"/>
+            <a:r>
+              <a:rPr/>
+              <a:t>The tests in the survey dictionary each have one thing wrong with them,</a:t>
+            </a:r>
+          </a:p>
+          <a:p>
+            <a:pPr lvl="0"/>
+            <a:r>
+              <a:rPr/>
+              <a:t>This is enough the trip the validator. When a tests fails, it’s for a single reason.</a:t>
             </a:r>
           </a:p>
         </p:txBody>
@@ -5259,7 +5329,7 @@
             </a:pPr>
             <a:r>
               <a:rPr/>
-              <a:t>Generating Test Labels</a:t>
+              <a:t>Producing Test Labels</a:t>
             </a:r>
           </a:p>
         </p:txBody>
@@ -5283,6 +5353,13 @@
             <a:r>
               <a:rPr/>
               <a:t>Hand writing labels</a:t>
+            </a:r>
+          </a:p>
+          <a:p>
+            <a:pPr lvl="1"/>
+            <a:r>
+              <a:rPr/>
+              <a:t>Labels are just XML files, and can be written in any text editor.</a:t>
             </a:r>
           </a:p>
           <a:p>

</xml_diff>

<commit_message>
added a recap slide to the beginning
</commit_message>
<xml_diff>
--- a/LDDTesting/stone-LDDTestingTechniques.pptx
+++ b/LDDTesting/stone-LDDTestingTechniques.pptx
@@ -28,6 +28,7 @@
     <p:sldId id="276" r:id="rId22"/>
     <p:sldId id="277" r:id="rId23"/>
     <p:sldId id="278" r:id="rId24"/>
+    <p:sldId id="279" r:id="rId25"/>
   </p:sldIdLst>
   <p:sldSz cx="9144000" cy="5143500" type="screen16x9"/>
   <p:notesSz cx="6858000" cy="9144000"/>
@@ -3231,7 +3232,12 @@
             <p:ph type="title"/>
           </p:nvPr>
         </p:nvSpPr>
-        <p:spPr/>
+        <p:spPr>
+          <a:xfrm>
+            <a:off x="457201" y="204787"/>
+            <a:ext cx="3008313" cy="871538"/>
+          </a:xfrm>
+        </p:spPr>
         <p:txBody>
           <a:bodyPr/>
           <a:lstStyle/>
@@ -3241,44 +3247,120 @@
             </a:pPr>
             <a:r>
               <a:rPr/>
-              <a:t>Monolithic tests</a:t>
-            </a:r>
-          </a:p>
-        </p:txBody>
-      </p:sp>
-      <p:sp>
-        <p:nvSpPr>
-          <p:cNvPr id="3" name="Content Placeholder 2"/>
-          <p:cNvSpPr>
-            <a:spLocks noGrp="1"/>
-          </p:cNvSpPr>
-          <p:nvPr>
-            <p:ph idx="1"/>
-          </p:nvPr>
-        </p:nvSpPr>
-        <p:spPr/>
-        <p:txBody>
-          <a:bodyPr/>
-          <a:lstStyle/>
-          <a:p>
-            <a:pPr lvl="0"/>
-            <a:r>
-              <a:rPr/>
-              <a:t>Multiple tests can be packed into a single label</a:t>
-            </a:r>
-          </a:p>
-          <a:p>
-            <a:pPr lvl="0"/>
-            <a:r>
-              <a:rPr/>
-              <a:t>Document each point where the test is expected to fail</a:t>
-            </a:r>
-          </a:p>
-          <a:p>
-            <a:pPr lvl="0"/>
-            <a:r>
-              <a:rPr/>
-              <a:t>Examine the output of the test run to determine if there are any missed failures</a:t>
+              <a:t>Demonstration - LDD Test Generator</a:t>
+            </a:r>
+          </a:p>
+        </p:txBody>
+      </p:sp>
+      <p:sp>
+        <p:nvSpPr>
+          <p:cNvPr id="4" name="Text Placeholder 3"/>
+          <p:cNvSpPr>
+            <a:spLocks noGrp="1"/>
+          </p:cNvSpPr>
+          <p:nvPr>
+            <p:ph idx="2" sz="half" type="body"/>
+          </p:nvPr>
+        </p:nvSpPr>
+        <p:spPr/>
+        <p:txBody>
+          <a:bodyPr/>
+          <a:lstStyle/>
+          <a:p>
+            <a:pPr lvl="0" indent="0" marL="0">
+              <a:buNone/>
+            </a:pPr>
+            <a:r>
+              <a:rPr>
+                <a:hlinkClick r:id="rId2"/>
+              </a:rPr>
+              <a:t>https://github.com/sbn-psi/ldd_utilities/tree/master/LddTestGenerator</a:t>
+            </a:r>
+          </a:p>
+          <a:p>
+            <a:pPr lvl="0" indent="0" marL="0">
+              <a:spcBef>
+                <a:spcPts val="3000"/>
+              </a:spcBef>
+              <a:buNone/>
+            </a:pPr>
+            <a:r>
+              <a:rPr b="1"/>
+              <a:t>Objectives</a:t>
+            </a:r>
+          </a:p>
+          <a:p>
+            <a:pPr lvl="0"/>
+            <a:r>
+              <a:rPr/>
+              <a:t>Demonstrate a template-based approach to generating test labels</a:t>
+            </a:r>
+          </a:p>
+          <a:p>
+            <a:pPr lvl="0"/>
+            <a:r>
+              <a:rPr/>
+              <a:t>Mention how the framework could be expanded to mutate test files</a:t>
+            </a:r>
+          </a:p>
+        </p:txBody>
+      </p:sp>
+      <p:pic>
+        <p:nvPicPr>
+          <p:cNvPr descr="fig:  images/common/generator.png" id="0" name="Picture 1"/>
+          <p:cNvPicPr>
+            <a:picLocks noGrp="1" noChangeAspect="1"/>
+          </p:cNvPicPr>
+          <p:nvPr/>
+        </p:nvPicPr>
+        <p:blipFill>
+          <a:blip r:embed="rId3"/>
+          <a:stretch>
+            <a:fillRect/>
+          </a:stretch>
+        </p:blipFill>
+        <p:spPr bwMode="auto">
+          <a:xfrm>
+            <a:off x="4191000" y="203200"/>
+            <a:ext cx="3873500" cy="3873500"/>
+          </a:xfrm>
+          <a:prstGeom prst="rect">
+            <a:avLst/>
+          </a:prstGeom>
+          <a:noFill/>
+          <a:ln w="9525">
+            <a:noFill/>
+            <a:headEnd/>
+            <a:tailEnd/>
+          </a:ln>
+        </p:spPr>
+      </p:pic>
+      <p:sp>
+        <p:nvSpPr>
+          <p:cNvPr id="1" name="TextBox 3"/>
+          <p:cNvSpPr txBox="1"/>
+          <p:nvPr/>
+        </p:nvSpPr>
+        <p:spPr>
+          <a:xfrm>
+            <a:off x="3568700" y="4076700"/>
+            <a:ext cx="5105400" cy="508000"/>
+          </a:xfrm>
+          <a:prstGeom prst="rect">
+            <a:avLst/>
+          </a:prstGeom>
+          <a:noFill/>
+        </p:spPr>
+        <p:txBody>
+          <a:bodyPr/>
+          <a:lstStyle/>
+          <a:p>
+            <a:pPr lvl="0" indent="0" marL="0" algn="ctr">
+              <a:buNone/>
+            </a:pPr>
+            <a:r>
+              <a:rPr/>
+              <a:t>generator</a:t>
             </a:r>
           </a:p>
         </p:txBody>
@@ -3289,6 +3371,90 @@
 </file>
 
 <file path=ppt/slides/slide11.xml><?xml version="1.0" encoding="utf-8"?>
+<p:sld xmlns:a="http://schemas.openxmlformats.org/drawingml/2006/main" xmlns:r="http://schemas.openxmlformats.org/officeDocument/2006/relationships" xmlns:p="http://schemas.openxmlformats.org/presentationml/2006/main">
+  <p:cSld>
+    <p:spTree>
+      <p:nvGrpSpPr>
+        <p:cNvPr id="1" name=""/>
+        <p:cNvGrpSpPr/>
+        <p:nvPr/>
+      </p:nvGrpSpPr>
+      <p:grpSpPr>
+        <a:xfrm>
+          <a:off x="0" y="0"/>
+          <a:ext cx="0" cy="0"/>
+          <a:chOff x="0" y="0"/>
+          <a:chExt cx="0" cy="0"/>
+        </a:xfrm>
+      </p:grpSpPr>
+      <p:sp>
+        <p:nvSpPr>
+          <p:cNvPr id="2" name="Title 1"/>
+          <p:cNvSpPr>
+            <a:spLocks noGrp="1"/>
+          </p:cNvSpPr>
+          <p:nvPr>
+            <p:ph type="title"/>
+          </p:nvPr>
+        </p:nvSpPr>
+        <p:spPr/>
+        <p:txBody>
+          <a:bodyPr/>
+          <a:lstStyle/>
+          <a:p>
+            <a:pPr lvl="0" indent="0" marL="0">
+              <a:buNone/>
+            </a:pPr>
+            <a:r>
+              <a:rPr/>
+              <a:t>Monolithic tests</a:t>
+            </a:r>
+          </a:p>
+        </p:txBody>
+      </p:sp>
+      <p:sp>
+        <p:nvSpPr>
+          <p:cNvPr id="3" name="Content Placeholder 2"/>
+          <p:cNvSpPr>
+            <a:spLocks noGrp="1"/>
+          </p:cNvSpPr>
+          <p:nvPr>
+            <p:ph idx="1"/>
+          </p:nvPr>
+        </p:nvSpPr>
+        <p:spPr/>
+        <p:txBody>
+          <a:bodyPr/>
+          <a:lstStyle/>
+          <a:p>
+            <a:pPr lvl="0"/>
+            <a:r>
+              <a:rPr/>
+              <a:t>Multiple tests can be packed into a single label</a:t>
+            </a:r>
+          </a:p>
+          <a:p>
+            <a:pPr lvl="0"/>
+            <a:r>
+              <a:rPr/>
+              <a:t>Document each point where the test is expected to fail</a:t>
+            </a:r>
+          </a:p>
+          <a:p>
+            <a:pPr lvl="0"/>
+            <a:r>
+              <a:rPr/>
+              <a:t>Examine the output of the test run to determine if there are any missed failures</a:t>
+            </a:r>
+          </a:p>
+        </p:txBody>
+      </p:sp>
+    </p:spTree>
+  </p:cSld>
+</p:sld>
+</file>
+
+<file path=ppt/slides/slide12.xml><?xml version="1.0" encoding="utf-8"?>
 <p:sld xmlns:a="http://schemas.openxmlformats.org/drawingml/2006/main" xmlns:r="http://schemas.openxmlformats.org/officeDocument/2006/relationships" xmlns:p="http://schemas.openxmlformats.org/presentationml/2006/main">
   <p:cSld>
     <p:spTree>
@@ -3474,90 +3640,6 @@
 </p:sld>
 </file>
 
-<file path=ppt/slides/slide12.xml><?xml version="1.0" encoding="utf-8"?>
-<p:sld xmlns:a="http://schemas.openxmlformats.org/drawingml/2006/main" xmlns:r="http://schemas.openxmlformats.org/officeDocument/2006/relationships" xmlns:p="http://schemas.openxmlformats.org/presentationml/2006/main">
-  <p:cSld>
-    <p:spTree>
-      <p:nvGrpSpPr>
-        <p:cNvPr id="1" name=""/>
-        <p:cNvGrpSpPr/>
-        <p:nvPr/>
-      </p:nvGrpSpPr>
-      <p:grpSpPr>
-        <a:xfrm>
-          <a:off x="0" y="0"/>
-          <a:ext cx="0" cy="0"/>
-          <a:chOff x="0" y="0"/>
-          <a:chExt cx="0" cy="0"/>
-        </a:xfrm>
-      </p:grpSpPr>
-      <p:sp>
-        <p:nvSpPr>
-          <p:cNvPr id="2" name="Title 1"/>
-          <p:cNvSpPr>
-            <a:spLocks noGrp="1"/>
-          </p:cNvSpPr>
-          <p:nvPr>
-            <p:ph type="title"/>
-          </p:nvPr>
-        </p:nvSpPr>
-        <p:spPr/>
-        <p:txBody>
-          <a:bodyPr/>
-          <a:lstStyle/>
-          <a:p>
-            <a:pPr lvl="0" indent="0" marL="0">
-              <a:buNone/>
-            </a:pPr>
-            <a:r>
-              <a:rPr/>
-              <a:t>Interpreting the test output for monolithic tests</a:t>
-            </a:r>
-          </a:p>
-        </p:txBody>
-      </p:sp>
-      <p:sp>
-        <p:nvSpPr>
-          <p:cNvPr id="3" name="Content Placeholder 2"/>
-          <p:cNvSpPr>
-            <a:spLocks noGrp="1"/>
-          </p:cNvSpPr>
-          <p:nvPr>
-            <p:ph idx="1"/>
-          </p:nvPr>
-        </p:nvSpPr>
-        <p:spPr/>
-        <p:txBody>
-          <a:bodyPr/>
-          <a:lstStyle/>
-          <a:p>
-            <a:pPr lvl="0"/>
-            <a:r>
-              <a:rPr/>
-              <a:t>Since monolithic tests have only a pass/fail result, and there are multiple expected failures, it’s possible to miss failures</a:t>
-            </a:r>
-          </a:p>
-          <a:p>
-            <a:pPr lvl="0"/>
-            <a:r>
-              <a:rPr/>
-              <a:t>This can be mitigated by expecting a certain number of failures, or checking for specific failure messages</a:t>
-            </a:r>
-          </a:p>
-          <a:p>
-            <a:pPr lvl="1"/>
-            <a:r>
-              <a:rPr/>
-              <a:t>This would require updates to the testing framework</a:t>
-            </a:r>
-          </a:p>
-        </p:txBody>
-      </p:sp>
-    </p:spTree>
-  </p:cSld>
-</p:sld>
-</file>
-
 <file path=ppt/slides/slide13.xml><?xml version="1.0" encoding="utf-8"?>
 <p:sld xmlns:a="http://schemas.openxmlformats.org/drawingml/2006/main" xmlns:r="http://schemas.openxmlformats.org/officeDocument/2006/relationships" xmlns:p="http://schemas.openxmlformats.org/presentationml/2006/main">
   <p:cSld>
@@ -3595,7 +3677,7 @@
             </a:pPr>
             <a:r>
               <a:rPr/>
-              <a:t>How many tests?</a:t>
+              <a:t>Interpreting the test output for monolithic tests</a:t>
             </a:r>
           </a:p>
         </p:txBody>
@@ -3618,21 +3700,21 @@
             <a:pPr lvl="0"/>
             <a:r>
               <a:rPr/>
-              <a:t>You want to have enough to thoroughly test your dictionary.</a:t>
+              <a:t>Since monolithic tests have only a pass/fail result, and there are multiple expected failures, it’s possible to miss failures</a:t>
+            </a:r>
+          </a:p>
+          <a:p>
+            <a:pPr lvl="0"/>
+            <a:r>
+              <a:rPr/>
+              <a:t>This can be mitigated by expecting a certain number of failures, or checking for specific failure messages</a:t>
             </a:r>
           </a:p>
           <a:p>
             <a:pPr lvl="1"/>
             <a:r>
               <a:rPr/>
-              <a:t>Typically, this means that every class should be used at least once</a:t>
-            </a:r>
-          </a:p>
-          <a:p>
-            <a:pPr lvl="1"/>
-            <a:r>
-              <a:rPr/>
-              <a:t>Every Schematron rule should pass and fail at least once, as well.</a:t>
+              <a:t>This would require updates to the testing framework</a:t>
             </a:r>
           </a:p>
         </p:txBody>
@@ -3679,7 +3761,7 @@
             </a:pPr>
             <a:r>
               <a:rPr/>
-              <a:t>The case against too many tests</a:t>
+              <a:t>How many tests?</a:t>
             </a:r>
           </a:p>
         </p:txBody>
@@ -3702,36 +3784,21 @@
             <a:pPr lvl="0"/>
             <a:r>
               <a:rPr/>
-              <a:t>Too many tests can cause problems (This does </a:t>
-            </a:r>
-            <a:r>
-              <a:rPr i="1"/>
-              <a:t>not</a:t>
-            </a:r>
-            <a:r>
-              <a:rPr/>
-              <a:t> mean don’t write tests)</a:t>
+              <a:t>You want to have enough to thoroughly test your dictionary.</a:t>
             </a:r>
           </a:p>
           <a:p>
             <a:pPr lvl="1"/>
             <a:r>
               <a:rPr/>
-              <a:t>The biggest problem with too many tests is that they need to be maintained</a:t>
+              <a:t>Typically, this means that every class should be used at least once</a:t>
             </a:r>
           </a:p>
           <a:p>
             <a:pPr lvl="1"/>
             <a:r>
               <a:rPr/>
-              <a:t>Maintenance can be necessary when either your dictionary changes, or when the dependencies change (IM changes, upstream dictionaries, etc)</a:t>
-            </a:r>
-          </a:p>
-          <a:p>
-            <a:pPr lvl="1"/>
-            <a:r>
-              <a:rPr/>
-              <a:t>A test should have its own job – it shouldn’t just functionally duplicate another test</a:t>
+              <a:t>Every Schematron rule should pass and fail at least once, as well.</a:t>
             </a:r>
           </a:p>
         </p:txBody>
@@ -3778,7 +3845,7 @@
             </a:pPr>
             <a:r>
               <a:rPr/>
-              <a:t>Exercise every class</a:t>
+              <a:t>The case against too many tests</a:t>
             </a:r>
           </a:p>
         </p:txBody>
@@ -3801,14 +3868,36 @@
             <a:pPr lvl="0"/>
             <a:r>
               <a:rPr/>
-              <a:t>At least one passing test should use each class</a:t>
-            </a:r>
-          </a:p>
-          <a:p>
-            <a:pPr lvl="0"/>
-            <a:r>
-              <a:rPr/>
-              <a:t>Write as many test files as necessary to achieve this.</a:t>
+              <a:t>Too many tests can cause problems (This does </a:t>
+            </a:r>
+            <a:r>
+              <a:rPr i="1"/>
+              <a:t>not</a:t>
+            </a:r>
+            <a:r>
+              <a:rPr/>
+              <a:t> mean don’t write tests)</a:t>
+            </a:r>
+          </a:p>
+          <a:p>
+            <a:pPr lvl="1"/>
+            <a:r>
+              <a:rPr/>
+              <a:t>The biggest problem with too many tests is that they need to be maintained</a:t>
+            </a:r>
+          </a:p>
+          <a:p>
+            <a:pPr lvl="1"/>
+            <a:r>
+              <a:rPr/>
+              <a:t>Maintenance can be necessary when either your dictionary changes, or when the dependencies change (IM changes, upstream dictionaries, etc)</a:t>
+            </a:r>
+          </a:p>
+          <a:p>
+            <a:pPr lvl="1"/>
+            <a:r>
+              <a:rPr/>
+              <a:t>A test should have its own job – it shouldn’t just functionally duplicate another test</a:t>
             </a:r>
           </a:p>
         </p:txBody>
@@ -3855,7 +3944,7 @@
             </a:pPr>
             <a:r>
               <a:rPr/>
-              <a:t>Exercise every Schematron rule</a:t>
+              <a:t>Exercise every class</a:t>
             </a:r>
           </a:p>
         </p:txBody>
@@ -3878,28 +3967,14 @@
             <a:pPr lvl="0"/>
             <a:r>
               <a:rPr/>
-              <a:t>At least one invalid label test should fail each Schematron rule.</a:t>
-            </a:r>
-          </a:p>
-          <a:p>
-            <a:pPr lvl="0"/>
-            <a:r>
-              <a:rPr/>
-              <a:t>At least one valid label test should pass each Schematron rule</a:t>
-            </a:r>
-          </a:p>
-          <a:p>
-            <a:pPr lvl="0"/>
-            <a:r>
-              <a:rPr/>
-              <a:t>At least one valid label test should not trigger the Schematron rule, if possible.</a:t>
-            </a:r>
-          </a:p>
-          <a:p>
-            <a:pPr lvl="0"/>
-            <a:r>
-              <a:rPr/>
-              <a:t>This is especially important, since Schematron rules can be prevented from triggering if incorrectly written.</a:t>
+              <a:t>At least one passing test should use each class</a:t>
+            </a:r>
+          </a:p>
+          <a:p>
+            <a:pPr lvl="0"/>
+            <a:r>
+              <a:rPr/>
+              <a:t>Write as many test files as necessary to achieve this.</a:t>
             </a:r>
           </a:p>
         </p:txBody>
@@ -3910,6 +3985,97 @@
 </file>
 
 <file path=ppt/slides/slide17.xml><?xml version="1.0" encoding="utf-8"?>
+<p:sld xmlns:a="http://schemas.openxmlformats.org/drawingml/2006/main" xmlns:r="http://schemas.openxmlformats.org/officeDocument/2006/relationships" xmlns:p="http://schemas.openxmlformats.org/presentationml/2006/main">
+  <p:cSld>
+    <p:spTree>
+      <p:nvGrpSpPr>
+        <p:cNvPr id="1" name=""/>
+        <p:cNvGrpSpPr/>
+        <p:nvPr/>
+      </p:nvGrpSpPr>
+      <p:grpSpPr>
+        <a:xfrm>
+          <a:off x="0" y="0"/>
+          <a:ext cx="0" cy="0"/>
+          <a:chOff x="0" y="0"/>
+          <a:chExt cx="0" cy="0"/>
+        </a:xfrm>
+      </p:grpSpPr>
+      <p:sp>
+        <p:nvSpPr>
+          <p:cNvPr id="2" name="Title 1"/>
+          <p:cNvSpPr>
+            <a:spLocks noGrp="1"/>
+          </p:cNvSpPr>
+          <p:nvPr>
+            <p:ph type="title"/>
+          </p:nvPr>
+        </p:nvSpPr>
+        <p:spPr/>
+        <p:txBody>
+          <a:bodyPr/>
+          <a:lstStyle/>
+          <a:p>
+            <a:pPr lvl="0" indent="0" marL="0">
+              <a:buNone/>
+            </a:pPr>
+            <a:r>
+              <a:rPr/>
+              <a:t>Exercise every Schematron rule</a:t>
+            </a:r>
+          </a:p>
+        </p:txBody>
+      </p:sp>
+      <p:sp>
+        <p:nvSpPr>
+          <p:cNvPr id="3" name="Content Placeholder 2"/>
+          <p:cNvSpPr>
+            <a:spLocks noGrp="1"/>
+          </p:cNvSpPr>
+          <p:nvPr>
+            <p:ph idx="1"/>
+          </p:nvPr>
+        </p:nvSpPr>
+        <p:spPr/>
+        <p:txBody>
+          <a:bodyPr/>
+          <a:lstStyle/>
+          <a:p>
+            <a:pPr lvl="0"/>
+            <a:r>
+              <a:rPr/>
+              <a:t>At least one invalid label test should fail each Schematron rule.</a:t>
+            </a:r>
+          </a:p>
+          <a:p>
+            <a:pPr lvl="0"/>
+            <a:r>
+              <a:rPr/>
+              <a:t>At least one valid label test should pass each Schematron rule</a:t>
+            </a:r>
+          </a:p>
+          <a:p>
+            <a:pPr lvl="0"/>
+            <a:r>
+              <a:rPr/>
+              <a:t>At least one valid label test should not trigger the Schematron rule, if possible.</a:t>
+            </a:r>
+          </a:p>
+          <a:p>
+            <a:pPr lvl="0"/>
+            <a:r>
+              <a:rPr/>
+              <a:t>This is especially important, since Schematron rules can be prevented from triggering if incorrectly written.</a:t>
+            </a:r>
+          </a:p>
+        </p:txBody>
+      </p:sp>
+    </p:spTree>
+  </p:cSld>
+</p:sld>
+</file>
+
+<file path=ppt/slides/slide18.xml><?xml version="1.0" encoding="utf-8"?>
 <p:sld xmlns:a="http://schemas.openxmlformats.org/drawingml/2006/main" xmlns:r="http://schemas.openxmlformats.org/officeDocument/2006/relationships" xmlns:p="http://schemas.openxmlformats.org/presentationml/2006/main">
   <p:cSld>
     <p:spTree>
@@ -4095,90 +4261,6 @@
 </p:sld>
 </file>
 
-<file path=ppt/slides/slide18.xml><?xml version="1.0" encoding="utf-8"?>
-<p:sld xmlns:a="http://schemas.openxmlformats.org/drawingml/2006/main" xmlns:r="http://schemas.openxmlformats.org/officeDocument/2006/relationships" xmlns:p="http://schemas.openxmlformats.org/presentationml/2006/main">
-  <p:cSld>
-    <p:spTree>
-      <p:nvGrpSpPr>
-        <p:cNvPr id="1" name=""/>
-        <p:cNvGrpSpPr/>
-        <p:nvPr/>
-      </p:nvGrpSpPr>
-      <p:grpSpPr>
-        <a:xfrm>
-          <a:off x="0" y="0"/>
-          <a:ext cx="0" cy="0"/>
-          <a:chOff x="0" y="0"/>
-          <a:chExt cx="0" cy="0"/>
-        </a:xfrm>
-      </p:grpSpPr>
-      <p:sp>
-        <p:nvSpPr>
-          <p:cNvPr id="2" name="Title 1"/>
-          <p:cNvSpPr>
-            <a:spLocks noGrp="1"/>
-          </p:cNvSpPr>
-          <p:nvPr>
-            <p:ph type="title"/>
-          </p:nvPr>
-        </p:nvSpPr>
-        <p:spPr/>
-        <p:txBody>
-          <a:bodyPr/>
-          <a:lstStyle/>
-          <a:p>
-            <a:pPr lvl="0" indent="0" marL="0">
-              <a:buNone/>
-            </a:pPr>
-            <a:r>
-              <a:rPr/>
-              <a:t>Document the tests - What to document and why</a:t>
-            </a:r>
-          </a:p>
-        </p:txBody>
-      </p:sp>
-      <p:sp>
-        <p:nvSpPr>
-          <p:cNvPr id="3" name="Content Placeholder 2"/>
-          <p:cNvSpPr>
-            <a:spLocks noGrp="1"/>
-          </p:cNvSpPr>
-          <p:nvPr>
-            <p:ph idx="1"/>
-          </p:nvPr>
-        </p:nvSpPr>
-        <p:spPr/>
-        <p:txBody>
-          <a:bodyPr/>
-          <a:lstStyle/>
-          <a:p>
-            <a:pPr lvl="0"/>
-            <a:r>
-              <a:rPr/>
-              <a:t>Each test should somehow document what is being tested.</a:t>
-            </a:r>
-          </a:p>
-          <a:p>
-            <a:pPr lvl="0"/>
-            <a:r>
-              <a:rPr/>
-              <a:t>This will remind you how each test is expected to fail, or what each test is intended to exercise.</a:t>
-            </a:r>
-          </a:p>
-          <a:p>
-            <a:pPr lvl="0"/>
-            <a:r>
-              <a:rPr/>
-              <a:t>If writing a monolithic test, this can be further developed into the expected output for comparison in a future version of the EN testing tool.</a:t>
-            </a:r>
-          </a:p>
-        </p:txBody>
-      </p:sp>
-    </p:spTree>
-  </p:cSld>
-</p:sld>
-</file>
-
 <file path=ppt/slides/slide19.xml><?xml version="1.0" encoding="utf-8"?>
 <p:sld xmlns:a="http://schemas.openxmlformats.org/drawingml/2006/main" xmlns:r="http://schemas.openxmlformats.org/officeDocument/2006/relationships" xmlns:p="http://schemas.openxmlformats.org/presentationml/2006/main">
   <p:cSld>
@@ -4239,14 +4321,21 @@
             <a:pPr lvl="0"/>
             <a:r>
               <a:rPr/>
-              <a:t>Documentation can be as simple as a file that lists the test name and what it is testing.</a:t>
-            </a:r>
-          </a:p>
-          <a:p>
-            <a:pPr lvl="0"/>
-            <a:r>
-              <a:rPr/>
-              <a:t>Documentation can also be written inline. It would be valuable to note precisely which line should fail.</a:t>
+              <a:t>Each test should somehow document what is being tested.</a:t>
+            </a:r>
+          </a:p>
+          <a:p>
+            <a:pPr lvl="0"/>
+            <a:r>
+              <a:rPr/>
+              <a:t>This will remind you how each test is expected to fail, or what each test is intended to exercise.</a:t>
+            </a:r>
+          </a:p>
+          <a:p>
+            <a:pPr lvl="0"/>
+            <a:r>
+              <a:rPr/>
+              <a:t>If writing a monolithic test, this can be further developed into the expected output for comparison in a future version of the EN testing tool.</a:t>
             </a:r>
           </a:p>
         </p:txBody>
@@ -4293,7 +4382,7 @@
             </a:pPr>
             <a:r>
               <a:rPr/>
-              <a:t>What should we keep in mind while writing tests?</a:t>
+              <a:t>Recap of our goals with testing</a:t>
             </a:r>
           </a:p>
         </p:txBody>
@@ -4316,28 +4405,35 @@
             <a:pPr lvl="0"/>
             <a:r>
               <a:rPr/>
-              <a:t>Tests should be maintainable and understandable</a:t>
-            </a:r>
-          </a:p>
-          <a:p>
-            <a:pPr lvl="0"/>
-            <a:r>
-              <a:rPr/>
-              <a:t>Tests should be documented and well organized</a:t>
-            </a:r>
-          </a:p>
-          <a:p>
-            <a:pPr lvl="0"/>
-            <a:r>
-              <a:rPr/>
-              <a:t>Tests should provide good coverage</a:t>
-            </a:r>
-          </a:p>
-          <a:p>
-            <a:pPr lvl="0"/>
-            <a:r>
-              <a:rPr/>
-              <a:t>Tests should communicate the right amount of information</a:t>
+              <a:t>Ensure that the dictionary does what we want it to do</a:t>
+            </a:r>
+          </a:p>
+          <a:p>
+            <a:pPr lvl="0"/>
+            <a:r>
+              <a:rPr/>
+              <a:t>Ensure that all class definitions are correct</a:t>
+            </a:r>
+          </a:p>
+          <a:p>
+            <a:pPr lvl="0"/>
+            <a:r>
+              <a:rPr/>
+              <a:t>Ensure that all of the schematron rules work</a:t>
+            </a:r>
+          </a:p>
+          <a:p>
+            <a:pPr lvl="0"/>
+            <a:r>
+              <a:rPr/>
+              <a:t>Prevent regressions</a:t>
+            </a:r>
+          </a:p>
+          <a:p>
+            <a:pPr lvl="0"/>
+            <a:r>
+              <a:rPr/>
+              <a:t>Detect non-backwards compatible changes</a:t>
             </a:r>
           </a:p>
         </p:txBody>
@@ -4384,7 +4480,7 @@
             </a:pPr>
             <a:r>
               <a:rPr/>
-              <a:t>Organize the tests</a:t>
+              <a:t>Document the tests - What to document and why</a:t>
             </a:r>
           </a:p>
         </p:txBody>
@@ -4404,12 +4500,17 @@
           <a:bodyPr/>
           <a:lstStyle/>
           <a:p>
-            <a:pPr lvl="0" indent="0" marL="0">
-              <a:buNone/>
-            </a:pPr>
-            <a:r>
-              <a:rPr/>
-              <a:t>At minimum, tests should be organized into valid and invalid label tests. Although this is embedded in the name, sorting them will make it easier to find the test that you need, especially as the number of tests grows.</a:t>
+            <a:pPr lvl="0"/>
+            <a:r>
+              <a:rPr/>
+              <a:t>Documentation can be as simple as a file that lists the test name and what it is testing.</a:t>
+            </a:r>
+          </a:p>
+          <a:p>
+            <a:pPr lvl="0"/>
+            <a:r>
+              <a:rPr/>
+              <a:t>Documentation can also be written inline. It would be valuable to note precisely which line should fail.</a:t>
             </a:r>
           </a:p>
         </p:txBody>
@@ -4420,6 +4521,78 @@
 </file>
 
 <file path=ppt/slides/slide21.xml><?xml version="1.0" encoding="utf-8"?>
+<p:sld xmlns:a="http://schemas.openxmlformats.org/drawingml/2006/main" xmlns:r="http://schemas.openxmlformats.org/officeDocument/2006/relationships" xmlns:p="http://schemas.openxmlformats.org/presentationml/2006/main">
+  <p:cSld>
+    <p:spTree>
+      <p:nvGrpSpPr>
+        <p:cNvPr id="1" name=""/>
+        <p:cNvGrpSpPr/>
+        <p:nvPr/>
+      </p:nvGrpSpPr>
+      <p:grpSpPr>
+        <a:xfrm>
+          <a:off x="0" y="0"/>
+          <a:ext cx="0" cy="0"/>
+          <a:chOff x="0" y="0"/>
+          <a:chExt cx="0" cy="0"/>
+        </a:xfrm>
+      </p:grpSpPr>
+      <p:sp>
+        <p:nvSpPr>
+          <p:cNvPr id="2" name="Title 1"/>
+          <p:cNvSpPr>
+            <a:spLocks noGrp="1"/>
+          </p:cNvSpPr>
+          <p:nvPr>
+            <p:ph type="title"/>
+          </p:nvPr>
+        </p:nvSpPr>
+        <p:spPr/>
+        <p:txBody>
+          <a:bodyPr/>
+          <a:lstStyle/>
+          <a:p>
+            <a:pPr lvl="0" indent="0" marL="0">
+              <a:buNone/>
+            </a:pPr>
+            <a:r>
+              <a:rPr/>
+              <a:t>Organize the tests</a:t>
+            </a:r>
+          </a:p>
+        </p:txBody>
+      </p:sp>
+      <p:sp>
+        <p:nvSpPr>
+          <p:cNvPr id="3" name="Content Placeholder 2"/>
+          <p:cNvSpPr>
+            <a:spLocks noGrp="1"/>
+          </p:cNvSpPr>
+          <p:nvPr>
+            <p:ph idx="1"/>
+          </p:nvPr>
+        </p:nvSpPr>
+        <p:spPr/>
+        <p:txBody>
+          <a:bodyPr/>
+          <a:lstStyle/>
+          <a:p>
+            <a:pPr lvl="0" indent="0" marL="0">
+              <a:buNone/>
+            </a:pPr>
+            <a:r>
+              <a:rPr/>
+              <a:t>At minimum, tests should be organized into valid and invalid label tests. Although this is embedded in the name, sorting them will make it easier to find the test that you need, especially as the number of tests grows.</a:t>
+            </a:r>
+          </a:p>
+        </p:txBody>
+      </p:sp>
+    </p:spTree>
+  </p:cSld>
+</p:sld>
+</file>
+
+<file path=ppt/slides/slide22.xml><?xml version="1.0" encoding="utf-8"?>
 <p:sld xmlns:a="http://schemas.openxmlformats.org/drawingml/2006/main" xmlns:r="http://schemas.openxmlformats.org/officeDocument/2006/relationships" xmlns:p="http://schemas.openxmlformats.org/presentationml/2006/main">
   <p:cSld>
     <p:spTree>
@@ -4570,7 +4743,7 @@
 </p:sld>
 </file>
 
-<file path=ppt/slides/slide22.xml><?xml version="1.0" encoding="utf-8"?>
+<file path=ppt/slides/slide23.xml><?xml version="1.0" encoding="utf-8"?>
 <p:sld xmlns:a="http://schemas.openxmlformats.org/drawingml/2006/main" xmlns:r="http://schemas.openxmlformats.org/officeDocument/2006/relationships" xmlns:p="http://schemas.openxmlformats.org/presentationml/2006/main">
   <p:cSld>
     <p:spTree>
@@ -4691,7 +4864,7 @@
 </p:sld>
 </file>
 
-<file path=ppt/slides/slide23.xml><?xml version="1.0" encoding="utf-8"?>
+<file path=ppt/slides/slide24.xml><?xml version="1.0" encoding="utf-8"?>
 <p:sld xmlns:a="http://schemas.openxmlformats.org/drawingml/2006/main" xmlns:r="http://schemas.openxmlformats.org/officeDocument/2006/relationships" xmlns:p="http://schemas.openxmlformats.org/presentationml/2006/main">
   <p:cSld>
     <p:spTree>
@@ -4849,7 +5022,7 @@
             </a:pPr>
             <a:r>
               <a:rPr/>
-              <a:t>Keeping labels uniform</a:t>
+              <a:t>What should we keep in mind while writing tests?</a:t>
             </a:r>
           </a:p>
         </p:txBody>
@@ -4872,14 +5045,28 @@
             <a:pPr lvl="0"/>
             <a:r>
               <a:rPr/>
-              <a:t>Unnecessary variations in the label will make it more difficult to track down errors.</a:t>
-            </a:r>
-          </a:p>
-          <a:p>
-            <a:pPr lvl="0"/>
-            <a:r>
-              <a:rPr/>
-              <a:t>Sometimes variations are necessary when a discipline area can apply to different data types</a:t>
+              <a:t>Tests should be maintainable and understandable</a:t>
+            </a:r>
+          </a:p>
+          <a:p>
+            <a:pPr lvl="0"/>
+            <a:r>
+              <a:rPr/>
+              <a:t>Tests should be documented and well organized</a:t>
+            </a:r>
+          </a:p>
+          <a:p>
+            <a:pPr lvl="0"/>
+            <a:r>
+              <a:rPr/>
+              <a:t>Tests should provide good coverage</a:t>
+            </a:r>
+          </a:p>
+          <a:p>
+            <a:pPr lvl="0"/>
+            <a:r>
+              <a:rPr/>
+              <a:t>Tests should communicate the right amount of information</a:t>
             </a:r>
           </a:p>
         </p:txBody>
@@ -4926,7 +5113,7 @@
             </a:pPr>
             <a:r>
               <a:rPr/>
-              <a:t>Monolithic tests vs granular tests</a:t>
+              <a:t>Keeping labels uniform</a:t>
             </a:r>
           </a:p>
         </p:txBody>
@@ -4949,14 +5136,14 @@
             <a:pPr lvl="0"/>
             <a:r>
               <a:rPr/>
-              <a:t>The testing framework that we are using is better suited for granular tests</a:t>
-            </a:r>
-          </a:p>
-          <a:p>
-            <a:pPr lvl="0"/>
-            <a:r>
-              <a:rPr/>
-              <a:t>Monolithic tests are currently easier to generate and maintain</a:t>
+              <a:t>Unnecessary variations in the label will make it more difficult to track down errors.</a:t>
+            </a:r>
+          </a:p>
+          <a:p>
+            <a:pPr lvl="0"/>
+            <a:r>
+              <a:rPr/>
+              <a:t>Sometimes variations are necessary when a discipline area can apply to different data types</a:t>
             </a:r>
           </a:p>
         </p:txBody>
@@ -5003,7 +5190,7 @@
             </a:pPr>
             <a:r>
               <a:rPr/>
-              <a:t>Keeping tests granular</a:t>
+              <a:t>Monolithic tests vs granular tests</a:t>
             </a:r>
           </a:p>
         </p:txBody>
@@ -5026,14 +5213,14 @@
             <a:pPr lvl="0"/>
             <a:r>
               <a:rPr/>
-              <a:t>Each label is invalid in only one way</a:t>
-            </a:r>
-          </a:p>
-          <a:p>
-            <a:pPr lvl="0"/>
-            <a:r>
-              <a:rPr/>
-              <a:t>Combining multiple errors in a single file will mask errors that don’t occur, since the testing framework only knows if a label passed or failed.</a:t>
+              <a:t>The testing framework that we are using is better suited for granular tests</a:t>
+            </a:r>
+          </a:p>
+          <a:p>
+            <a:pPr lvl="0"/>
+            <a:r>
+              <a:rPr/>
+              <a:t>Monolithic tests are currently easier to generate and maintain</a:t>
             </a:r>
           </a:p>
         </p:txBody>
@@ -5080,7 +5267,7 @@
             </a:pPr>
             <a:r>
               <a:rPr/>
-              <a:t>Drawbacks to granular tests</a:t>
+              <a:t>Keeping tests granular</a:t>
             </a:r>
           </a:p>
         </p:txBody>
@@ -5103,14 +5290,14 @@
             <a:pPr lvl="0"/>
             <a:r>
               <a:rPr/>
-              <a:t>Granular tests will increase the number of labels that the LDD is tested against</a:t>
-            </a:r>
-          </a:p>
-          <a:p>
-            <a:pPr lvl="0"/>
-            <a:r>
-              <a:rPr/>
-              <a:t>Each of these labels will need to be maintained individually</a:t>
+              <a:t>Each label is invalid in only one way</a:t>
+            </a:r>
+          </a:p>
+          <a:p>
+            <a:pPr lvl="0"/>
+            <a:r>
+              <a:rPr/>
+              <a:t>Combining multiple errors in a single file will mask errors that don’t occur, since the testing framework only knows if a label passed or failed.</a:t>
             </a:r>
           </a:p>
         </p:txBody>
@@ -5121,6 +5308,83 @@
 </file>
 
 <file path=ppt/slides/slide7.xml><?xml version="1.0" encoding="utf-8"?>
+<p:sld xmlns:a="http://schemas.openxmlformats.org/drawingml/2006/main" xmlns:r="http://schemas.openxmlformats.org/officeDocument/2006/relationships" xmlns:p="http://schemas.openxmlformats.org/presentationml/2006/main">
+  <p:cSld>
+    <p:spTree>
+      <p:nvGrpSpPr>
+        <p:cNvPr id="1" name=""/>
+        <p:cNvGrpSpPr/>
+        <p:nvPr/>
+      </p:nvGrpSpPr>
+      <p:grpSpPr>
+        <a:xfrm>
+          <a:off x="0" y="0"/>
+          <a:ext cx="0" cy="0"/>
+          <a:chOff x="0" y="0"/>
+          <a:chExt cx="0" cy="0"/>
+        </a:xfrm>
+      </p:grpSpPr>
+      <p:sp>
+        <p:nvSpPr>
+          <p:cNvPr id="2" name="Title 1"/>
+          <p:cNvSpPr>
+            <a:spLocks noGrp="1"/>
+          </p:cNvSpPr>
+          <p:nvPr>
+            <p:ph type="title"/>
+          </p:nvPr>
+        </p:nvSpPr>
+        <p:spPr/>
+        <p:txBody>
+          <a:bodyPr/>
+          <a:lstStyle/>
+          <a:p>
+            <a:pPr lvl="0" indent="0" marL="0">
+              <a:buNone/>
+            </a:pPr>
+            <a:r>
+              <a:rPr/>
+              <a:t>Drawbacks to granular tests</a:t>
+            </a:r>
+          </a:p>
+        </p:txBody>
+      </p:sp>
+      <p:sp>
+        <p:nvSpPr>
+          <p:cNvPr id="3" name="Content Placeholder 2"/>
+          <p:cNvSpPr>
+            <a:spLocks noGrp="1"/>
+          </p:cNvSpPr>
+          <p:nvPr>
+            <p:ph idx="1"/>
+          </p:nvPr>
+        </p:nvSpPr>
+        <p:spPr/>
+        <p:txBody>
+          <a:bodyPr/>
+          <a:lstStyle/>
+          <a:p>
+            <a:pPr lvl="0"/>
+            <a:r>
+              <a:rPr/>
+              <a:t>Granular tests will increase the number of labels that the LDD is tested against</a:t>
+            </a:r>
+          </a:p>
+          <a:p>
+            <a:pPr lvl="0"/>
+            <a:r>
+              <a:rPr/>
+              <a:t>Each of these labels will need to be maintained individually</a:t>
+            </a:r>
+          </a:p>
+        </p:txBody>
+      </p:sp>
+    </p:spTree>
+  </p:cSld>
+</p:sld>
+</file>
+
+<file path=ppt/slides/slide8.xml><?xml version="1.0" encoding="utf-8"?>
 <p:sld xmlns:a="http://schemas.openxmlformats.org/drawingml/2006/main" xmlns:r="http://schemas.openxmlformats.org/officeDocument/2006/relationships" xmlns:p="http://schemas.openxmlformats.org/presentationml/2006/main">
   <p:cSld>
     <p:spTree>
@@ -5292,119 +5556,6 @@
 </p:sld>
 </file>
 
-<file path=ppt/slides/slide8.xml><?xml version="1.0" encoding="utf-8"?>
-<p:sld xmlns:a="http://schemas.openxmlformats.org/drawingml/2006/main" xmlns:r="http://schemas.openxmlformats.org/officeDocument/2006/relationships" xmlns:p="http://schemas.openxmlformats.org/presentationml/2006/main">
-  <p:cSld>
-    <p:spTree>
-      <p:nvGrpSpPr>
-        <p:cNvPr id="1" name=""/>
-        <p:cNvGrpSpPr/>
-        <p:nvPr/>
-      </p:nvGrpSpPr>
-      <p:grpSpPr>
-        <a:xfrm>
-          <a:off x="0" y="0"/>
-          <a:ext cx="0" cy="0"/>
-          <a:chOff x="0" y="0"/>
-          <a:chExt cx="0" cy="0"/>
-        </a:xfrm>
-      </p:grpSpPr>
-      <p:sp>
-        <p:nvSpPr>
-          <p:cNvPr id="2" name="Title 1"/>
-          <p:cNvSpPr>
-            <a:spLocks noGrp="1"/>
-          </p:cNvSpPr>
-          <p:nvPr>
-            <p:ph type="title"/>
-          </p:nvPr>
-        </p:nvSpPr>
-        <p:spPr/>
-        <p:txBody>
-          <a:bodyPr/>
-          <a:lstStyle/>
-          <a:p>
-            <a:pPr lvl="0" indent="0" marL="0">
-              <a:buNone/>
-            </a:pPr>
-            <a:r>
-              <a:rPr/>
-              <a:t>Producing Test Labels</a:t>
-            </a:r>
-          </a:p>
-        </p:txBody>
-      </p:sp>
-      <p:sp>
-        <p:nvSpPr>
-          <p:cNvPr id="3" name="Content Placeholder 2"/>
-          <p:cNvSpPr>
-            <a:spLocks noGrp="1"/>
-          </p:cNvSpPr>
-          <p:nvPr>
-            <p:ph idx="1"/>
-          </p:nvPr>
-        </p:nvSpPr>
-        <p:spPr/>
-        <p:txBody>
-          <a:bodyPr/>
-          <a:lstStyle/>
-          <a:p>
-            <a:pPr lvl="0"/>
-            <a:r>
-              <a:rPr/>
-              <a:t>Hand writing labels</a:t>
-            </a:r>
-          </a:p>
-          <a:p>
-            <a:pPr lvl="1"/>
-            <a:r>
-              <a:rPr/>
-              <a:t>Labels are just XML files, and can be written in any text editor.</a:t>
-            </a:r>
-          </a:p>
-          <a:p>
-            <a:pPr lvl="0"/>
-            <a:r>
-              <a:rPr/>
-              <a:t>Injecting discipline area fragments into label templates</a:t>
-            </a:r>
-          </a:p>
-          <a:p>
-            <a:pPr lvl="1"/>
-            <a:r>
-              <a:rPr/>
-              <a:t>In addition to making the labels easier to generate, the parts of the label that are being tested are separated from the rest of the label.</a:t>
-            </a:r>
-          </a:p>
-          <a:p>
-            <a:pPr lvl="0"/>
-            <a:r>
-              <a:rPr/>
-              <a:t>Mutating existing labels</a:t>
-            </a:r>
-          </a:p>
-          <a:p>
-            <a:pPr lvl="1"/>
-            <a:r>
-              <a:rPr/>
-              <a:t>Keep a mapping of </a:t>
-            </a:r>
-            <a:r>
-              <a:rPr i="1"/>
-              <a:t>XPath</a:t>
-            </a:r>
-            <a:r>
-              <a:rPr/>
-              <a:t>s and operations to perform on a location</a:t>
-            </a:r>
-          </a:p>
-        </p:txBody>
-      </p:sp>
-    </p:spTree>
-  </p:cSld>
-</p:sld>
-</file>
-
 <file path=ppt/slides/slide9.xml><?xml version="1.0" encoding="utf-8"?>
 <p:sld xmlns:a="http://schemas.openxmlformats.org/drawingml/2006/main" xmlns:r="http://schemas.openxmlformats.org/officeDocument/2006/relationships" xmlns:p="http://schemas.openxmlformats.org/presentationml/2006/main">
   <p:cSld>
@@ -5432,12 +5583,7 @@
             <p:ph type="title"/>
           </p:nvPr>
         </p:nvSpPr>
-        <p:spPr>
-          <a:xfrm>
-            <a:off x="457201" y="204787"/>
-            <a:ext cx="3008313" cy="871538"/>
-          </a:xfrm>
-        </p:spPr>
+        <p:spPr/>
         <p:txBody>
           <a:bodyPr/>
           <a:lstStyle/>
@@ -5447,120 +5593,73 @@
             </a:pPr>
             <a:r>
               <a:rPr/>
-              <a:t>Demonstration - LDD Test Generator</a:t>
-            </a:r>
-          </a:p>
-        </p:txBody>
-      </p:sp>
-      <p:sp>
-        <p:nvSpPr>
-          <p:cNvPr id="4" name="Text Placeholder 3"/>
-          <p:cNvSpPr>
-            <a:spLocks noGrp="1"/>
-          </p:cNvSpPr>
-          <p:nvPr>
-            <p:ph idx="2" sz="half" type="body"/>
-          </p:nvPr>
-        </p:nvSpPr>
-        <p:spPr/>
-        <p:txBody>
-          <a:bodyPr/>
-          <a:lstStyle/>
-          <a:p>
-            <a:pPr lvl="0" indent="0" marL="0">
-              <a:buNone/>
-            </a:pPr>
-            <a:r>
-              <a:rPr>
-                <a:hlinkClick r:id="rId2"/>
-              </a:rPr>
-              <a:t>https://github.com/sbn-psi/ldd_utilities/tree/master/LddTestGenerator</a:t>
-            </a:r>
-          </a:p>
-          <a:p>
-            <a:pPr lvl="0" indent="0" marL="0">
-              <a:spcBef>
-                <a:spcPts val="3000"/>
-              </a:spcBef>
-              <a:buNone/>
-            </a:pPr>
-            <a:r>
-              <a:rPr b="1"/>
-              <a:t>Objectives</a:t>
-            </a:r>
-          </a:p>
-          <a:p>
-            <a:pPr lvl="0"/>
-            <a:r>
-              <a:rPr/>
-              <a:t>Demonstrate a template-based approach to generating test labels</a:t>
-            </a:r>
-          </a:p>
-          <a:p>
-            <a:pPr lvl="0"/>
-            <a:r>
-              <a:rPr/>
-              <a:t>Mention how the framework could be expanded to mutate test files</a:t>
-            </a:r>
-          </a:p>
-        </p:txBody>
-      </p:sp>
-      <p:pic>
-        <p:nvPicPr>
-          <p:cNvPr descr="fig:  images/common/generator.png" id="0" name="Picture 1"/>
-          <p:cNvPicPr>
-            <a:picLocks noGrp="1" noChangeAspect="1"/>
-          </p:cNvPicPr>
-          <p:nvPr/>
-        </p:nvPicPr>
-        <p:blipFill>
-          <a:blip r:embed="rId3"/>
-          <a:stretch>
-            <a:fillRect/>
-          </a:stretch>
-        </p:blipFill>
-        <p:spPr bwMode="auto">
-          <a:xfrm>
-            <a:off x="4191000" y="203200"/>
-            <a:ext cx="3873500" cy="3873500"/>
-          </a:xfrm>
-          <a:prstGeom prst="rect">
-            <a:avLst/>
-          </a:prstGeom>
-          <a:noFill/>
-          <a:ln w="9525">
-            <a:noFill/>
-            <a:headEnd/>
-            <a:tailEnd/>
-          </a:ln>
-        </p:spPr>
-      </p:pic>
-      <p:sp>
-        <p:nvSpPr>
-          <p:cNvPr id="1" name="TextBox 3"/>
-          <p:cNvSpPr txBox="1"/>
-          <p:nvPr/>
-        </p:nvSpPr>
-        <p:spPr>
-          <a:xfrm>
-            <a:off x="3568700" y="4076700"/>
-            <a:ext cx="5105400" cy="508000"/>
-          </a:xfrm>
-          <a:prstGeom prst="rect">
-            <a:avLst/>
-          </a:prstGeom>
-          <a:noFill/>
-        </p:spPr>
-        <p:txBody>
-          <a:bodyPr/>
-          <a:lstStyle/>
-          <a:p>
-            <a:pPr lvl="0" indent="0" marL="0" algn="ctr">
-              <a:buNone/>
-            </a:pPr>
-            <a:r>
-              <a:rPr/>
-              <a:t>generator</a:t>
+              <a:t>Producing Test Labels</a:t>
+            </a:r>
+          </a:p>
+        </p:txBody>
+      </p:sp>
+      <p:sp>
+        <p:nvSpPr>
+          <p:cNvPr id="3" name="Content Placeholder 2"/>
+          <p:cNvSpPr>
+            <a:spLocks noGrp="1"/>
+          </p:cNvSpPr>
+          <p:nvPr>
+            <p:ph idx="1"/>
+          </p:nvPr>
+        </p:nvSpPr>
+        <p:spPr/>
+        <p:txBody>
+          <a:bodyPr/>
+          <a:lstStyle/>
+          <a:p>
+            <a:pPr lvl="0"/>
+            <a:r>
+              <a:rPr/>
+              <a:t>Hand writing labels</a:t>
+            </a:r>
+          </a:p>
+          <a:p>
+            <a:pPr lvl="1"/>
+            <a:r>
+              <a:rPr/>
+              <a:t>Labels are just XML files, and can be written in any text editor.</a:t>
+            </a:r>
+          </a:p>
+          <a:p>
+            <a:pPr lvl="0"/>
+            <a:r>
+              <a:rPr/>
+              <a:t>Injecting discipline area fragments into label templates</a:t>
+            </a:r>
+          </a:p>
+          <a:p>
+            <a:pPr lvl="1"/>
+            <a:r>
+              <a:rPr/>
+              <a:t>In addition to making the labels easier to generate, the parts of the label that are being tested are separated from the rest of the label.</a:t>
+            </a:r>
+          </a:p>
+          <a:p>
+            <a:pPr lvl="0"/>
+            <a:r>
+              <a:rPr/>
+              <a:t>Mutating existing labels</a:t>
+            </a:r>
+          </a:p>
+          <a:p>
+            <a:pPr lvl="1"/>
+            <a:r>
+              <a:rPr/>
+              <a:t>Keep a mapping of </a:t>
+            </a:r>
+            <a:r>
+              <a:rPr i="1"/>
+              <a:t>XPath</a:t>
+            </a:r>
+            <a:r>
+              <a:rPr/>
+              <a:t>s and operations to perform on a location</a:t>
             </a:r>
           </a:p>
         </p:txBody>

</xml_diff>

<commit_message>
Added an overview of test writing principles
</commit_message>
<xml_diff>
--- a/LDDTesting/stone-LDDTestingTechniques.pptx
+++ b/LDDTesting/stone-LDDTestingTechniques.pptx
@@ -29,6 +29,7 @@
     <p:sldId id="277" r:id="rId23"/>
     <p:sldId id="278" r:id="rId24"/>
     <p:sldId id="279" r:id="rId25"/>
+    <p:sldId id="280" r:id="rId26"/>
   </p:sldIdLst>
   <p:sldSz cx="9144000" cy="5143500" type="screen16x9"/>
   <p:notesSz cx="6858000" cy="9144000"/>
@@ -3232,6 +3233,119 @@
             <p:ph type="title"/>
           </p:nvPr>
         </p:nvSpPr>
+        <p:spPr/>
+        <p:txBody>
+          <a:bodyPr/>
+          <a:lstStyle/>
+          <a:p>
+            <a:pPr lvl="0" indent="0" marL="0">
+              <a:buNone/>
+            </a:pPr>
+            <a:r>
+              <a:rPr/>
+              <a:t>Producing Test Labels</a:t>
+            </a:r>
+          </a:p>
+        </p:txBody>
+      </p:sp>
+      <p:sp>
+        <p:nvSpPr>
+          <p:cNvPr id="3" name="Content Placeholder 2"/>
+          <p:cNvSpPr>
+            <a:spLocks noGrp="1"/>
+          </p:cNvSpPr>
+          <p:nvPr>
+            <p:ph idx="1"/>
+          </p:nvPr>
+        </p:nvSpPr>
+        <p:spPr/>
+        <p:txBody>
+          <a:bodyPr/>
+          <a:lstStyle/>
+          <a:p>
+            <a:pPr lvl="0"/>
+            <a:r>
+              <a:rPr/>
+              <a:t>Hand writing labels</a:t>
+            </a:r>
+          </a:p>
+          <a:p>
+            <a:pPr lvl="1"/>
+            <a:r>
+              <a:rPr/>
+              <a:t>Labels are just XML files, and can be written in any text editor.</a:t>
+            </a:r>
+          </a:p>
+          <a:p>
+            <a:pPr lvl="0"/>
+            <a:r>
+              <a:rPr/>
+              <a:t>Injecting discipline area fragments into label templates</a:t>
+            </a:r>
+          </a:p>
+          <a:p>
+            <a:pPr lvl="1"/>
+            <a:r>
+              <a:rPr/>
+              <a:t>In addition to making the labels easier to generate, the parts of the label that are being tested are separated from the rest of the label.</a:t>
+            </a:r>
+          </a:p>
+          <a:p>
+            <a:pPr lvl="0"/>
+            <a:r>
+              <a:rPr/>
+              <a:t>Mutating existing labels</a:t>
+            </a:r>
+          </a:p>
+          <a:p>
+            <a:pPr lvl="1"/>
+            <a:r>
+              <a:rPr/>
+              <a:t>Keep a mapping of </a:t>
+            </a:r>
+            <a:r>
+              <a:rPr i="1"/>
+              <a:t>XPath</a:t>
+            </a:r>
+            <a:r>
+              <a:rPr/>
+              <a:t>s and operations to perform on a location</a:t>
+            </a:r>
+          </a:p>
+        </p:txBody>
+      </p:sp>
+    </p:spTree>
+  </p:cSld>
+</p:sld>
+</file>
+
+<file path=ppt/slides/slide11.xml><?xml version="1.0" encoding="utf-8"?>
+<p:sld xmlns:a="http://schemas.openxmlformats.org/drawingml/2006/main" xmlns:r="http://schemas.openxmlformats.org/officeDocument/2006/relationships" xmlns:p="http://schemas.openxmlformats.org/presentationml/2006/main">
+  <p:cSld>
+    <p:spTree>
+      <p:nvGrpSpPr>
+        <p:cNvPr id="1" name=""/>
+        <p:cNvGrpSpPr/>
+        <p:nvPr/>
+      </p:nvGrpSpPr>
+      <p:grpSpPr>
+        <a:xfrm>
+          <a:off x="0" y="0"/>
+          <a:ext cx="0" cy="0"/>
+          <a:chOff x="0" y="0"/>
+          <a:chExt cx="0" cy="0"/>
+        </a:xfrm>
+      </p:grpSpPr>
+      <p:sp>
+        <p:nvSpPr>
+          <p:cNvPr id="2" name="Title 1"/>
+          <p:cNvSpPr>
+            <a:spLocks noGrp="1"/>
+          </p:cNvSpPr>
+          <p:nvPr>
+            <p:ph type="title"/>
+          </p:nvPr>
+        </p:nvSpPr>
         <p:spPr>
           <a:xfrm>
             <a:off x="457201" y="204787"/>
@@ -3370,7 +3484,7 @@
 </p:sld>
 </file>
 
-<file path=ppt/slides/slide11.xml><?xml version="1.0" encoding="utf-8"?>
+<file path=ppt/slides/slide12.xml><?xml version="1.0" encoding="utf-8"?>
 <p:sld xmlns:a="http://schemas.openxmlformats.org/drawingml/2006/main" xmlns:r="http://schemas.openxmlformats.org/officeDocument/2006/relationships" xmlns:p="http://schemas.openxmlformats.org/presentationml/2006/main">
   <p:cSld>
     <p:spTree>
@@ -3454,7 +3568,7 @@
 </p:sld>
 </file>
 
-<file path=ppt/slides/slide12.xml><?xml version="1.0" encoding="utf-8"?>
+<file path=ppt/slides/slide13.xml><?xml version="1.0" encoding="utf-8"?>
 <p:sld xmlns:a="http://schemas.openxmlformats.org/drawingml/2006/main" xmlns:r="http://schemas.openxmlformats.org/officeDocument/2006/relationships" xmlns:p="http://schemas.openxmlformats.org/presentationml/2006/main">
   <p:cSld>
     <p:spTree>
@@ -3640,90 +3754,6 @@
 </p:sld>
 </file>
 
-<file path=ppt/slides/slide13.xml><?xml version="1.0" encoding="utf-8"?>
-<p:sld xmlns:a="http://schemas.openxmlformats.org/drawingml/2006/main" xmlns:r="http://schemas.openxmlformats.org/officeDocument/2006/relationships" xmlns:p="http://schemas.openxmlformats.org/presentationml/2006/main">
-  <p:cSld>
-    <p:spTree>
-      <p:nvGrpSpPr>
-        <p:cNvPr id="1" name=""/>
-        <p:cNvGrpSpPr/>
-        <p:nvPr/>
-      </p:nvGrpSpPr>
-      <p:grpSpPr>
-        <a:xfrm>
-          <a:off x="0" y="0"/>
-          <a:ext cx="0" cy="0"/>
-          <a:chOff x="0" y="0"/>
-          <a:chExt cx="0" cy="0"/>
-        </a:xfrm>
-      </p:grpSpPr>
-      <p:sp>
-        <p:nvSpPr>
-          <p:cNvPr id="2" name="Title 1"/>
-          <p:cNvSpPr>
-            <a:spLocks noGrp="1"/>
-          </p:cNvSpPr>
-          <p:nvPr>
-            <p:ph type="title"/>
-          </p:nvPr>
-        </p:nvSpPr>
-        <p:spPr/>
-        <p:txBody>
-          <a:bodyPr/>
-          <a:lstStyle/>
-          <a:p>
-            <a:pPr lvl="0" indent="0" marL="0">
-              <a:buNone/>
-            </a:pPr>
-            <a:r>
-              <a:rPr/>
-              <a:t>Interpreting the test output for monolithic tests</a:t>
-            </a:r>
-          </a:p>
-        </p:txBody>
-      </p:sp>
-      <p:sp>
-        <p:nvSpPr>
-          <p:cNvPr id="3" name="Content Placeholder 2"/>
-          <p:cNvSpPr>
-            <a:spLocks noGrp="1"/>
-          </p:cNvSpPr>
-          <p:nvPr>
-            <p:ph idx="1"/>
-          </p:nvPr>
-        </p:nvSpPr>
-        <p:spPr/>
-        <p:txBody>
-          <a:bodyPr/>
-          <a:lstStyle/>
-          <a:p>
-            <a:pPr lvl="0"/>
-            <a:r>
-              <a:rPr/>
-              <a:t>Since monolithic tests have only a pass/fail result, and there are multiple expected failures, it’s possible to miss failures</a:t>
-            </a:r>
-          </a:p>
-          <a:p>
-            <a:pPr lvl="0"/>
-            <a:r>
-              <a:rPr/>
-              <a:t>This can be mitigated by expecting a certain number of failures, or checking for specific failure messages</a:t>
-            </a:r>
-          </a:p>
-          <a:p>
-            <a:pPr lvl="1"/>
-            <a:r>
-              <a:rPr/>
-              <a:t>This would require updates to the testing framework</a:t>
-            </a:r>
-          </a:p>
-        </p:txBody>
-      </p:sp>
-    </p:spTree>
-  </p:cSld>
-</p:sld>
-</file>
-
 <file path=ppt/slides/slide14.xml><?xml version="1.0" encoding="utf-8"?>
 <p:sld xmlns:a="http://schemas.openxmlformats.org/drawingml/2006/main" xmlns:r="http://schemas.openxmlformats.org/officeDocument/2006/relationships" xmlns:p="http://schemas.openxmlformats.org/presentationml/2006/main">
   <p:cSld>
@@ -3761,7 +3791,7 @@
             </a:pPr>
             <a:r>
               <a:rPr/>
-              <a:t>How many tests?</a:t>
+              <a:t>Interpreting the test output for monolithic tests</a:t>
             </a:r>
           </a:p>
         </p:txBody>
@@ -3784,21 +3814,21 @@
             <a:pPr lvl="0"/>
             <a:r>
               <a:rPr/>
-              <a:t>You want to have enough to thoroughly test your dictionary.</a:t>
+              <a:t>Since monolithic tests have only a pass/fail result, and there are multiple expected failures, it’s possible to miss failures</a:t>
+            </a:r>
+          </a:p>
+          <a:p>
+            <a:pPr lvl="0"/>
+            <a:r>
+              <a:rPr/>
+              <a:t>This can be mitigated by expecting a certain number of failures, or checking for specific failure messages</a:t>
             </a:r>
           </a:p>
           <a:p>
             <a:pPr lvl="1"/>
             <a:r>
               <a:rPr/>
-              <a:t>Typically, this means that every class should be used at least once</a:t>
-            </a:r>
-          </a:p>
-          <a:p>
-            <a:pPr lvl="1"/>
-            <a:r>
-              <a:rPr/>
-              <a:t>Every Schematron rule should pass and fail at least once, as well.</a:t>
+              <a:t>This would require updates to the testing framework</a:t>
             </a:r>
           </a:p>
         </p:txBody>
@@ -3845,7 +3875,7 @@
             </a:pPr>
             <a:r>
               <a:rPr/>
-              <a:t>The case against too many tests</a:t>
+              <a:t>How many tests?</a:t>
             </a:r>
           </a:p>
         </p:txBody>
@@ -3868,36 +3898,21 @@
             <a:pPr lvl="0"/>
             <a:r>
               <a:rPr/>
-              <a:t>Too many tests can cause problems (This does </a:t>
-            </a:r>
-            <a:r>
-              <a:rPr i="1"/>
-              <a:t>not</a:t>
-            </a:r>
-            <a:r>
-              <a:rPr/>
-              <a:t> mean don’t write tests)</a:t>
+              <a:t>You want to have enough to thoroughly test your dictionary.</a:t>
             </a:r>
           </a:p>
           <a:p>
             <a:pPr lvl="1"/>
             <a:r>
               <a:rPr/>
-              <a:t>The biggest problem with too many tests is that they need to be maintained</a:t>
+              <a:t>Typically, this means that every class should be used at least once</a:t>
             </a:r>
           </a:p>
           <a:p>
             <a:pPr lvl="1"/>
             <a:r>
               <a:rPr/>
-              <a:t>Maintenance can be necessary when either your dictionary changes, or when the dependencies change (IM changes, upstream dictionaries, etc)</a:t>
-            </a:r>
-          </a:p>
-          <a:p>
-            <a:pPr lvl="1"/>
-            <a:r>
-              <a:rPr/>
-              <a:t>A test should have its own job – it shouldn’t just functionally duplicate another test</a:t>
+              <a:t>Every Schematron rule should pass and fail at least once, as well.</a:t>
             </a:r>
           </a:p>
         </p:txBody>
@@ -3944,7 +3959,7 @@
             </a:pPr>
             <a:r>
               <a:rPr/>
-              <a:t>Exercise every class</a:t>
+              <a:t>The case against too many tests</a:t>
             </a:r>
           </a:p>
         </p:txBody>
@@ -3967,14 +3982,36 @@
             <a:pPr lvl="0"/>
             <a:r>
               <a:rPr/>
-              <a:t>At least one passing test should use each class</a:t>
-            </a:r>
-          </a:p>
-          <a:p>
-            <a:pPr lvl="0"/>
-            <a:r>
-              <a:rPr/>
-              <a:t>Write as many test files as necessary to achieve this.</a:t>
+              <a:t>Too many tests can cause problems (This does </a:t>
+            </a:r>
+            <a:r>
+              <a:rPr i="1"/>
+              <a:t>not</a:t>
+            </a:r>
+            <a:r>
+              <a:rPr/>
+              <a:t> mean don’t write tests)</a:t>
+            </a:r>
+          </a:p>
+          <a:p>
+            <a:pPr lvl="1"/>
+            <a:r>
+              <a:rPr/>
+              <a:t>The biggest problem with too many tests is that they need to be maintained</a:t>
+            </a:r>
+          </a:p>
+          <a:p>
+            <a:pPr lvl="1"/>
+            <a:r>
+              <a:rPr/>
+              <a:t>Maintenance can be necessary when either your dictionary changes, or when the dependencies change (IM changes, upstream dictionaries, etc)</a:t>
+            </a:r>
+          </a:p>
+          <a:p>
+            <a:pPr lvl="1"/>
+            <a:r>
+              <a:rPr/>
+              <a:t>A test should have its own job – it shouldn’t just functionally duplicate another test</a:t>
             </a:r>
           </a:p>
         </p:txBody>
@@ -4021,7 +4058,7 @@
             </a:pPr>
             <a:r>
               <a:rPr/>
-              <a:t>Exercise every Schematron rule</a:t>
+              <a:t>Exercise every class</a:t>
             </a:r>
           </a:p>
         </p:txBody>
@@ -4044,28 +4081,14 @@
             <a:pPr lvl="0"/>
             <a:r>
               <a:rPr/>
-              <a:t>At least one invalid label test should fail each Schematron rule.</a:t>
-            </a:r>
-          </a:p>
-          <a:p>
-            <a:pPr lvl="0"/>
-            <a:r>
-              <a:rPr/>
-              <a:t>At least one valid label test should pass each Schematron rule</a:t>
-            </a:r>
-          </a:p>
-          <a:p>
-            <a:pPr lvl="0"/>
-            <a:r>
-              <a:rPr/>
-              <a:t>At least one valid label test should not trigger the Schematron rule, if possible.</a:t>
-            </a:r>
-          </a:p>
-          <a:p>
-            <a:pPr lvl="0"/>
-            <a:r>
-              <a:rPr/>
-              <a:t>This is especially important, since Schematron rules can be prevented from triggering if incorrectly written.</a:t>
+              <a:t>At least one passing test should use each class</a:t>
+            </a:r>
+          </a:p>
+          <a:p>
+            <a:pPr lvl="0"/>
+            <a:r>
+              <a:rPr/>
+              <a:t>Write as many test files as necessary to achieve this.</a:t>
             </a:r>
           </a:p>
         </p:txBody>
@@ -4076,6 +4099,97 @@
 </file>
 
 <file path=ppt/slides/slide18.xml><?xml version="1.0" encoding="utf-8"?>
+<p:sld xmlns:a="http://schemas.openxmlformats.org/drawingml/2006/main" xmlns:r="http://schemas.openxmlformats.org/officeDocument/2006/relationships" xmlns:p="http://schemas.openxmlformats.org/presentationml/2006/main">
+  <p:cSld>
+    <p:spTree>
+      <p:nvGrpSpPr>
+        <p:cNvPr id="1" name=""/>
+        <p:cNvGrpSpPr/>
+        <p:nvPr/>
+      </p:nvGrpSpPr>
+      <p:grpSpPr>
+        <a:xfrm>
+          <a:off x="0" y="0"/>
+          <a:ext cx="0" cy="0"/>
+          <a:chOff x="0" y="0"/>
+          <a:chExt cx="0" cy="0"/>
+        </a:xfrm>
+      </p:grpSpPr>
+      <p:sp>
+        <p:nvSpPr>
+          <p:cNvPr id="2" name="Title 1"/>
+          <p:cNvSpPr>
+            <a:spLocks noGrp="1"/>
+          </p:cNvSpPr>
+          <p:nvPr>
+            <p:ph type="title"/>
+          </p:nvPr>
+        </p:nvSpPr>
+        <p:spPr/>
+        <p:txBody>
+          <a:bodyPr/>
+          <a:lstStyle/>
+          <a:p>
+            <a:pPr lvl="0" indent="0" marL="0">
+              <a:buNone/>
+            </a:pPr>
+            <a:r>
+              <a:rPr/>
+              <a:t>Exercise every Schematron rule</a:t>
+            </a:r>
+          </a:p>
+        </p:txBody>
+      </p:sp>
+      <p:sp>
+        <p:nvSpPr>
+          <p:cNvPr id="3" name="Content Placeholder 2"/>
+          <p:cNvSpPr>
+            <a:spLocks noGrp="1"/>
+          </p:cNvSpPr>
+          <p:nvPr>
+            <p:ph idx="1"/>
+          </p:nvPr>
+        </p:nvSpPr>
+        <p:spPr/>
+        <p:txBody>
+          <a:bodyPr/>
+          <a:lstStyle/>
+          <a:p>
+            <a:pPr lvl="0"/>
+            <a:r>
+              <a:rPr/>
+              <a:t>At least one invalid label test should fail each Schematron rule.</a:t>
+            </a:r>
+          </a:p>
+          <a:p>
+            <a:pPr lvl="0"/>
+            <a:r>
+              <a:rPr/>
+              <a:t>At least one valid label test should pass each Schematron rule</a:t>
+            </a:r>
+          </a:p>
+          <a:p>
+            <a:pPr lvl="0"/>
+            <a:r>
+              <a:rPr/>
+              <a:t>At least one valid label test should not trigger the Schematron rule, if possible.</a:t>
+            </a:r>
+          </a:p>
+          <a:p>
+            <a:pPr lvl="0"/>
+            <a:r>
+              <a:rPr/>
+              <a:t>Exercising the schematron rules is especially important, since Schematron rules can be prevented from triggering if incorrectly written.</a:t>
+            </a:r>
+          </a:p>
+        </p:txBody>
+      </p:sp>
+    </p:spTree>
+  </p:cSld>
+</p:sld>
+</file>
+
+<file path=ppt/slides/slide19.xml><?xml version="1.0" encoding="utf-8"?>
 <p:sld xmlns:a="http://schemas.openxmlformats.org/drawingml/2006/main" xmlns:r="http://schemas.openxmlformats.org/officeDocument/2006/relationships" xmlns:p="http://schemas.openxmlformats.org/presentationml/2006/main">
   <p:cSld>
     <p:spTree>
@@ -4261,90 +4375,6 @@
 </p:sld>
 </file>
 
-<file path=ppt/slides/slide19.xml><?xml version="1.0" encoding="utf-8"?>
-<p:sld xmlns:a="http://schemas.openxmlformats.org/drawingml/2006/main" xmlns:r="http://schemas.openxmlformats.org/officeDocument/2006/relationships" xmlns:p="http://schemas.openxmlformats.org/presentationml/2006/main">
-  <p:cSld>
-    <p:spTree>
-      <p:nvGrpSpPr>
-        <p:cNvPr id="1" name=""/>
-        <p:cNvGrpSpPr/>
-        <p:nvPr/>
-      </p:nvGrpSpPr>
-      <p:grpSpPr>
-        <a:xfrm>
-          <a:off x="0" y="0"/>
-          <a:ext cx="0" cy="0"/>
-          <a:chOff x="0" y="0"/>
-          <a:chExt cx="0" cy="0"/>
-        </a:xfrm>
-      </p:grpSpPr>
-      <p:sp>
-        <p:nvSpPr>
-          <p:cNvPr id="2" name="Title 1"/>
-          <p:cNvSpPr>
-            <a:spLocks noGrp="1"/>
-          </p:cNvSpPr>
-          <p:nvPr>
-            <p:ph type="title"/>
-          </p:nvPr>
-        </p:nvSpPr>
-        <p:spPr/>
-        <p:txBody>
-          <a:bodyPr/>
-          <a:lstStyle/>
-          <a:p>
-            <a:pPr lvl="0" indent="0" marL="0">
-              <a:buNone/>
-            </a:pPr>
-            <a:r>
-              <a:rPr/>
-              <a:t>Document the tests - What to document and why</a:t>
-            </a:r>
-          </a:p>
-        </p:txBody>
-      </p:sp>
-      <p:sp>
-        <p:nvSpPr>
-          <p:cNvPr id="3" name="Content Placeholder 2"/>
-          <p:cNvSpPr>
-            <a:spLocks noGrp="1"/>
-          </p:cNvSpPr>
-          <p:nvPr>
-            <p:ph idx="1"/>
-          </p:nvPr>
-        </p:nvSpPr>
-        <p:spPr/>
-        <p:txBody>
-          <a:bodyPr/>
-          <a:lstStyle/>
-          <a:p>
-            <a:pPr lvl="0"/>
-            <a:r>
-              <a:rPr/>
-              <a:t>Each test should somehow document what is being tested.</a:t>
-            </a:r>
-          </a:p>
-          <a:p>
-            <a:pPr lvl="0"/>
-            <a:r>
-              <a:rPr/>
-              <a:t>This will remind you how each test is expected to fail, or what each test is intended to exercise.</a:t>
-            </a:r>
-          </a:p>
-          <a:p>
-            <a:pPr lvl="0"/>
-            <a:r>
-              <a:rPr/>
-              <a:t>If writing a monolithic test, this can be further developed into the expected output for comparison in a future version of the EN testing tool.</a:t>
-            </a:r>
-          </a:p>
-        </p:txBody>
-      </p:sp>
-    </p:spTree>
-  </p:cSld>
-</p:sld>
-</file>
-
 <file path=ppt/slides/slide2.xml><?xml version="1.0" encoding="utf-8"?>
 <p:sld xmlns:a="http://schemas.openxmlformats.org/drawingml/2006/main" xmlns:r="http://schemas.openxmlformats.org/officeDocument/2006/relationships" xmlns:p="http://schemas.openxmlformats.org/presentationml/2006/main">
   <p:cSld>
@@ -4503,14 +4533,21 @@
             <a:pPr lvl="0"/>
             <a:r>
               <a:rPr/>
-              <a:t>Documentation can be as simple as a file that lists the test name and what it is testing.</a:t>
-            </a:r>
-          </a:p>
-          <a:p>
-            <a:pPr lvl="0"/>
-            <a:r>
-              <a:rPr/>
-              <a:t>Documentation can also be written inline. It would be valuable to note precisely which line should fail.</a:t>
+              <a:t>Each test should somehow document what is being tested.</a:t>
+            </a:r>
+          </a:p>
+          <a:p>
+            <a:pPr lvl="0"/>
+            <a:r>
+              <a:rPr/>
+              <a:t>This will remind you how each test is expected to fail, or what each test is intended to exercise.</a:t>
+            </a:r>
+          </a:p>
+          <a:p>
+            <a:pPr lvl="0"/>
+            <a:r>
+              <a:rPr/>
+              <a:t>If writing a monolithic test, this can be further developed into the expected output for comparison in a future version of the EN testing tool.</a:t>
             </a:r>
           </a:p>
         </p:txBody>
@@ -4557,7 +4594,7 @@
             </a:pPr>
             <a:r>
               <a:rPr/>
-              <a:t>Organize the tests</a:t>
+              <a:t>Document the tests - Where documentation goes</a:t>
             </a:r>
           </a:p>
         </p:txBody>
@@ -4577,12 +4614,17 @@
           <a:bodyPr/>
           <a:lstStyle/>
           <a:p>
-            <a:pPr lvl="0" indent="0" marL="0">
-              <a:buNone/>
-            </a:pPr>
-            <a:r>
-              <a:rPr/>
-              <a:t>At minimum, tests should be organized into valid and invalid label tests. Although this is embedded in the name, sorting them will make it easier to find the test that you need, especially as the number of tests grows.</a:t>
+            <a:pPr lvl="0"/>
+            <a:r>
+              <a:rPr/>
+              <a:t>Documentation can be as simple as a file that lists the test name and what it is testing.</a:t>
+            </a:r>
+          </a:p>
+          <a:p>
+            <a:pPr lvl="0"/>
+            <a:r>
+              <a:rPr/>
+              <a:t>Documentation can also be written inline. It would be valuable to note precisely which line should fail.</a:t>
             </a:r>
           </a:p>
         </p:txBody>
@@ -4593,6 +4635,78 @@
 </file>
 
 <file path=ppt/slides/slide22.xml><?xml version="1.0" encoding="utf-8"?>
+<p:sld xmlns:a="http://schemas.openxmlformats.org/drawingml/2006/main" xmlns:r="http://schemas.openxmlformats.org/officeDocument/2006/relationships" xmlns:p="http://schemas.openxmlformats.org/presentationml/2006/main">
+  <p:cSld>
+    <p:spTree>
+      <p:nvGrpSpPr>
+        <p:cNvPr id="1" name=""/>
+        <p:cNvGrpSpPr/>
+        <p:nvPr/>
+      </p:nvGrpSpPr>
+      <p:grpSpPr>
+        <a:xfrm>
+          <a:off x="0" y="0"/>
+          <a:ext cx="0" cy="0"/>
+          <a:chOff x="0" y="0"/>
+          <a:chExt cx="0" cy="0"/>
+        </a:xfrm>
+      </p:grpSpPr>
+      <p:sp>
+        <p:nvSpPr>
+          <p:cNvPr id="2" name="Title 1"/>
+          <p:cNvSpPr>
+            <a:spLocks noGrp="1"/>
+          </p:cNvSpPr>
+          <p:nvPr>
+            <p:ph type="title"/>
+          </p:nvPr>
+        </p:nvSpPr>
+        <p:spPr/>
+        <p:txBody>
+          <a:bodyPr/>
+          <a:lstStyle/>
+          <a:p>
+            <a:pPr lvl="0" indent="0" marL="0">
+              <a:buNone/>
+            </a:pPr>
+            <a:r>
+              <a:rPr/>
+              <a:t>Organize the tests</a:t>
+            </a:r>
+          </a:p>
+        </p:txBody>
+      </p:sp>
+      <p:sp>
+        <p:nvSpPr>
+          <p:cNvPr id="3" name="Content Placeholder 2"/>
+          <p:cNvSpPr>
+            <a:spLocks noGrp="1"/>
+          </p:cNvSpPr>
+          <p:nvPr>
+            <p:ph idx="1"/>
+          </p:nvPr>
+        </p:nvSpPr>
+        <p:spPr/>
+        <p:txBody>
+          <a:bodyPr/>
+          <a:lstStyle/>
+          <a:p>
+            <a:pPr lvl="0" indent="0" marL="0">
+              <a:buNone/>
+            </a:pPr>
+            <a:r>
+              <a:rPr/>
+              <a:t>At minimum, tests should be organized into valid and invalid label tests. Although this is embedded in the name, sorting them will make it easier to find the test that you need, especially as the number of tests grows.</a:t>
+            </a:r>
+          </a:p>
+        </p:txBody>
+      </p:sp>
+    </p:spTree>
+  </p:cSld>
+</p:sld>
+</file>
+
+<file path=ppt/slides/slide23.xml><?xml version="1.0" encoding="utf-8"?>
 <p:sld xmlns:a="http://schemas.openxmlformats.org/drawingml/2006/main" xmlns:r="http://schemas.openxmlformats.org/officeDocument/2006/relationships" xmlns:p="http://schemas.openxmlformats.org/presentationml/2006/main">
   <p:cSld>
     <p:spTree>
@@ -4743,7 +4857,7 @@
 </p:sld>
 </file>
 
-<file path=ppt/slides/slide23.xml><?xml version="1.0" encoding="utf-8"?>
+<file path=ppt/slides/slide24.xml><?xml version="1.0" encoding="utf-8"?>
 <p:sld xmlns:a="http://schemas.openxmlformats.org/drawingml/2006/main" xmlns:r="http://schemas.openxmlformats.org/officeDocument/2006/relationships" xmlns:p="http://schemas.openxmlformats.org/presentationml/2006/main">
   <p:cSld>
     <p:spTree>
@@ -4864,7 +4978,7 @@
 </p:sld>
 </file>
 
-<file path=ppt/slides/slide24.xml><?xml version="1.0" encoding="utf-8"?>
+<file path=ppt/slides/slide25.xml><?xml version="1.0" encoding="utf-8"?>
 <p:sld xmlns:a="http://schemas.openxmlformats.org/drawingml/2006/main" xmlns:r="http://schemas.openxmlformats.org/officeDocument/2006/relationships" xmlns:p="http://schemas.openxmlformats.org/presentationml/2006/main">
   <p:cSld>
     <p:spTree>
@@ -5113,7 +5227,7 @@
             </a:pPr>
             <a:r>
               <a:rPr/>
-              <a:t>Keeping labels uniform</a:t>
+              <a:t>Principles</a:t>
             </a:r>
           </a:p>
         </p:txBody>
@@ -5136,14 +5250,42 @@
             <a:pPr lvl="0"/>
             <a:r>
               <a:rPr/>
-              <a:t>Unnecessary variations in the label will make it more difficult to track down errors.</a:t>
-            </a:r>
-          </a:p>
-          <a:p>
-            <a:pPr lvl="0"/>
-            <a:r>
-              <a:rPr/>
-              <a:t>Sometimes variations are necessary when a discipline area can apply to different data types</a:t>
+              <a:t>Uniform labels</a:t>
+            </a:r>
+          </a:p>
+          <a:p>
+            <a:pPr lvl="0"/>
+            <a:r>
+              <a:rPr/>
+              <a:t>Granular or Monolithic tests?</a:t>
+            </a:r>
+          </a:p>
+          <a:p>
+            <a:pPr lvl="0"/>
+            <a:r>
+              <a:rPr/>
+              <a:t>Good test coverage</a:t>
+            </a:r>
+          </a:p>
+          <a:p>
+            <a:pPr lvl="0"/>
+            <a:r>
+              <a:rPr/>
+              <a:t>Minimize Redundancy</a:t>
+            </a:r>
+          </a:p>
+          <a:p>
+            <a:pPr lvl="0"/>
+            <a:r>
+              <a:rPr/>
+              <a:t>Documentation</a:t>
+            </a:r>
+          </a:p>
+          <a:p>
+            <a:pPr lvl="0"/>
+            <a:r>
+              <a:rPr/>
+              <a:t>Organization</a:t>
             </a:r>
           </a:p>
         </p:txBody>
@@ -5190,7 +5332,7 @@
             </a:pPr>
             <a:r>
               <a:rPr/>
-              <a:t>Monolithic tests vs granular tests</a:t>
+              <a:t>Keeping labels uniform</a:t>
             </a:r>
           </a:p>
         </p:txBody>
@@ -5213,14 +5355,14 @@
             <a:pPr lvl="0"/>
             <a:r>
               <a:rPr/>
-              <a:t>The testing framework that we are using is better suited for granular tests</a:t>
-            </a:r>
-          </a:p>
-          <a:p>
-            <a:pPr lvl="0"/>
-            <a:r>
-              <a:rPr/>
-              <a:t>Monolithic tests are currently easier to generate and maintain</a:t>
+              <a:t>Unnecessary variations in the label will make it more difficult to track down errors.</a:t>
+            </a:r>
+          </a:p>
+          <a:p>
+            <a:pPr lvl="0"/>
+            <a:r>
+              <a:rPr/>
+              <a:t>Sometimes variations are necessary when a discipline area can apply to different data types</a:t>
             </a:r>
           </a:p>
         </p:txBody>
@@ -5267,7 +5409,7 @@
             </a:pPr>
             <a:r>
               <a:rPr/>
-              <a:t>Keeping tests granular</a:t>
+              <a:t>Monolithic tests vs granular tests</a:t>
             </a:r>
           </a:p>
         </p:txBody>
@@ -5290,14 +5432,14 @@
             <a:pPr lvl="0"/>
             <a:r>
               <a:rPr/>
-              <a:t>Each label is invalid in only one way</a:t>
-            </a:r>
-          </a:p>
-          <a:p>
-            <a:pPr lvl="0"/>
-            <a:r>
-              <a:rPr/>
-              <a:t>Combining multiple errors in a single file will mask errors that don’t occur, since the testing framework only knows if a label passed or failed.</a:t>
+              <a:t>The testing framework that we are using is better suited for granular tests</a:t>
+            </a:r>
+          </a:p>
+          <a:p>
+            <a:pPr lvl="0"/>
+            <a:r>
+              <a:rPr/>
+              <a:t>Monolithic tests are currently easier to generate and maintain</a:t>
             </a:r>
           </a:p>
         </p:txBody>
@@ -5344,7 +5486,7 @@
             </a:pPr>
             <a:r>
               <a:rPr/>
-              <a:t>Drawbacks to granular tests</a:t>
+              <a:t>Keeping tests granular</a:t>
             </a:r>
           </a:p>
         </p:txBody>
@@ -5367,14 +5509,14 @@
             <a:pPr lvl="0"/>
             <a:r>
               <a:rPr/>
-              <a:t>Granular tests will increase the number of labels that the LDD is tested against</a:t>
-            </a:r>
-          </a:p>
-          <a:p>
-            <a:pPr lvl="0"/>
-            <a:r>
-              <a:rPr/>
-              <a:t>Each of these labels will need to be maintained individually</a:t>
+              <a:t>Each label is invalid in only one way</a:t>
+            </a:r>
+          </a:p>
+          <a:p>
+            <a:pPr lvl="0"/>
+            <a:r>
+              <a:rPr/>
+              <a:t>Combining multiple errors in a single file will mask errors that don’t occur, since the testing framework only knows if a label passed or failed.</a:t>
             </a:r>
           </a:p>
         </p:txBody>
@@ -5385,6 +5527,83 @@
 </file>
 
 <file path=ppt/slides/slide8.xml><?xml version="1.0" encoding="utf-8"?>
+<p:sld xmlns:a="http://schemas.openxmlformats.org/drawingml/2006/main" xmlns:r="http://schemas.openxmlformats.org/officeDocument/2006/relationships" xmlns:p="http://schemas.openxmlformats.org/presentationml/2006/main">
+  <p:cSld>
+    <p:spTree>
+      <p:nvGrpSpPr>
+        <p:cNvPr id="1" name=""/>
+        <p:cNvGrpSpPr/>
+        <p:nvPr/>
+      </p:nvGrpSpPr>
+      <p:grpSpPr>
+        <a:xfrm>
+          <a:off x="0" y="0"/>
+          <a:ext cx="0" cy="0"/>
+          <a:chOff x="0" y="0"/>
+          <a:chExt cx="0" cy="0"/>
+        </a:xfrm>
+      </p:grpSpPr>
+      <p:sp>
+        <p:nvSpPr>
+          <p:cNvPr id="2" name="Title 1"/>
+          <p:cNvSpPr>
+            <a:spLocks noGrp="1"/>
+          </p:cNvSpPr>
+          <p:nvPr>
+            <p:ph type="title"/>
+          </p:nvPr>
+        </p:nvSpPr>
+        <p:spPr/>
+        <p:txBody>
+          <a:bodyPr/>
+          <a:lstStyle/>
+          <a:p>
+            <a:pPr lvl="0" indent="0" marL="0">
+              <a:buNone/>
+            </a:pPr>
+            <a:r>
+              <a:rPr/>
+              <a:t>Drawbacks to granular tests</a:t>
+            </a:r>
+          </a:p>
+        </p:txBody>
+      </p:sp>
+      <p:sp>
+        <p:nvSpPr>
+          <p:cNvPr id="3" name="Content Placeholder 2"/>
+          <p:cNvSpPr>
+            <a:spLocks noGrp="1"/>
+          </p:cNvSpPr>
+          <p:nvPr>
+            <p:ph idx="1"/>
+          </p:nvPr>
+        </p:nvSpPr>
+        <p:spPr/>
+        <p:txBody>
+          <a:bodyPr/>
+          <a:lstStyle/>
+          <a:p>
+            <a:pPr lvl="0"/>
+            <a:r>
+              <a:rPr/>
+              <a:t>Granular tests will increase the number of labels that the LDD is tested against</a:t>
+            </a:r>
+          </a:p>
+          <a:p>
+            <a:pPr lvl="0"/>
+            <a:r>
+              <a:rPr/>
+              <a:t>Each of these labels will need to be maintained individually</a:t>
+            </a:r>
+          </a:p>
+        </p:txBody>
+      </p:sp>
+    </p:spTree>
+  </p:cSld>
+</p:sld>
+</file>
+
+<file path=ppt/slides/slide9.xml><?xml version="1.0" encoding="utf-8"?>
 <p:sld xmlns:a="http://schemas.openxmlformats.org/drawingml/2006/main" xmlns:r="http://schemas.openxmlformats.org/officeDocument/2006/relationships" xmlns:p="http://schemas.openxmlformats.org/presentationml/2006/main">
   <p:cSld>
     <p:spTree>
@@ -5547,119 +5766,6 @@
             <a:r>
               <a:rPr/>
               <a:t>ldd-survey</a:t>
-            </a:r>
-          </a:p>
-        </p:txBody>
-      </p:sp>
-    </p:spTree>
-  </p:cSld>
-</p:sld>
-</file>
-
-<file path=ppt/slides/slide9.xml><?xml version="1.0" encoding="utf-8"?>
-<p:sld xmlns:a="http://schemas.openxmlformats.org/drawingml/2006/main" xmlns:r="http://schemas.openxmlformats.org/officeDocument/2006/relationships" xmlns:p="http://schemas.openxmlformats.org/presentationml/2006/main">
-  <p:cSld>
-    <p:spTree>
-      <p:nvGrpSpPr>
-        <p:cNvPr id="1" name=""/>
-        <p:cNvGrpSpPr/>
-        <p:nvPr/>
-      </p:nvGrpSpPr>
-      <p:grpSpPr>
-        <a:xfrm>
-          <a:off x="0" y="0"/>
-          <a:ext cx="0" cy="0"/>
-          <a:chOff x="0" y="0"/>
-          <a:chExt cx="0" cy="0"/>
-        </a:xfrm>
-      </p:grpSpPr>
-      <p:sp>
-        <p:nvSpPr>
-          <p:cNvPr id="2" name="Title 1"/>
-          <p:cNvSpPr>
-            <a:spLocks noGrp="1"/>
-          </p:cNvSpPr>
-          <p:nvPr>
-            <p:ph type="title"/>
-          </p:nvPr>
-        </p:nvSpPr>
-        <p:spPr/>
-        <p:txBody>
-          <a:bodyPr/>
-          <a:lstStyle/>
-          <a:p>
-            <a:pPr lvl="0" indent="0" marL="0">
-              <a:buNone/>
-            </a:pPr>
-            <a:r>
-              <a:rPr/>
-              <a:t>Producing Test Labels</a:t>
-            </a:r>
-          </a:p>
-        </p:txBody>
-      </p:sp>
-      <p:sp>
-        <p:nvSpPr>
-          <p:cNvPr id="3" name="Content Placeholder 2"/>
-          <p:cNvSpPr>
-            <a:spLocks noGrp="1"/>
-          </p:cNvSpPr>
-          <p:nvPr>
-            <p:ph idx="1"/>
-          </p:nvPr>
-        </p:nvSpPr>
-        <p:spPr/>
-        <p:txBody>
-          <a:bodyPr/>
-          <a:lstStyle/>
-          <a:p>
-            <a:pPr lvl="0"/>
-            <a:r>
-              <a:rPr/>
-              <a:t>Hand writing labels</a:t>
-            </a:r>
-          </a:p>
-          <a:p>
-            <a:pPr lvl="1"/>
-            <a:r>
-              <a:rPr/>
-              <a:t>Labels are just XML files, and can be written in any text editor.</a:t>
-            </a:r>
-          </a:p>
-          <a:p>
-            <a:pPr lvl="0"/>
-            <a:r>
-              <a:rPr/>
-              <a:t>Injecting discipline area fragments into label templates</a:t>
-            </a:r>
-          </a:p>
-          <a:p>
-            <a:pPr lvl="1"/>
-            <a:r>
-              <a:rPr/>
-              <a:t>In addition to making the labels easier to generate, the parts of the label that are being tested are separated from the rest of the label.</a:t>
-            </a:r>
-          </a:p>
-          <a:p>
-            <a:pPr lvl="0"/>
-            <a:r>
-              <a:rPr/>
-              <a:t>Mutating existing labels</a:t>
-            </a:r>
-          </a:p>
-          <a:p>
-            <a:pPr lvl="1"/>
-            <a:r>
-              <a:rPr/>
-              <a:t>Keep a mapping of </a:t>
-            </a:r>
-            <a:r>
-              <a:rPr i="1"/>
-              <a:t>XPath</a:t>
-            </a:r>
-            <a:r>
-              <a:rPr/>
-              <a:t>s and operations to perform on a location</a:t>
             </a:r>
           </a:p>
         </p:txBody>

</xml_diff>

<commit_message>
Added more about minimum required tests, and test organization
</commit_message>
<xml_diff>
--- a/LDDTesting/stone-LDDTestingTechniques.pptx
+++ b/LDDTesting/stone-LDDTestingTechniques.pptx
@@ -4081,7 +4081,21 @@
             <a:pPr lvl="0"/>
             <a:r>
               <a:rPr/>
+              <a:t>At minimum, at least one passing test should use each public class</a:t>
+            </a:r>
+          </a:p>
+          <a:p>
+            <a:pPr lvl="0"/>
+            <a:r>
+              <a:rPr/>
               <a:t>At least one passing test should use each class</a:t>
+            </a:r>
+          </a:p>
+          <a:p>
+            <a:pPr lvl="0"/>
+            <a:r>
+              <a:rPr/>
+              <a:t>It is better to write tests specifically for this, so that other tests still have only one job.</a:t>
             </a:r>
           </a:p>
           <a:p>
@@ -4691,12 +4705,24 @@
           <a:bodyPr/>
           <a:lstStyle/>
           <a:p>
-            <a:pPr lvl="0" indent="0" marL="0">
-              <a:buNone/>
-            </a:pPr>
-            <a:r>
-              <a:rPr/>
-              <a:t>At minimum, tests should be organized into valid and invalid label tests. Although this is embedded in the name, sorting them will make it easier to find the test that you need, especially as the number of tests grows.</a:t>
+            <a:pPr lvl="0"/>
+            <a:r>
+              <a:rPr/>
+              <a:t>A simple way to organize tests is by sorting them into valid and invalid label tests.</a:t>
+            </a:r>
+          </a:p>
+          <a:p>
+            <a:pPr lvl="1"/>
+            <a:r>
+              <a:rPr/>
+              <a:t>Although this is embedded in the name, sorting them will make it easier to find the test that you need, especially as the number of tests grows.</a:t>
+            </a:r>
+          </a:p>
+          <a:p>
+            <a:pPr lvl="0"/>
+            <a:r>
+              <a:rPr/>
+              <a:t>If there are a large number of schematron rules, a good alternative would be to sort tests by schematron rule.</a:t>
             </a:r>
           </a:p>
         </p:txBody>

</xml_diff>

<commit_message>
Updated techniques document based on feedback from Raugh.
</commit_message>
<xml_diff>
--- a/LDDTesting/stone-LDDTestingTechniques.pptx
+++ b/LDDTesting/stone-LDDTestingTechniques.pptx
@@ -3407,7 +3407,7 @@
             <a:pPr lvl="0"/>
             <a:r>
               <a:rPr/>
-              <a:t>Demonstrate a template-based approach to generating test labels</a:t>
+              <a:t>Demonstrate a template/mutation-based approach to generating test labels</a:t>
             </a:r>
           </a:p>
           <a:p>
@@ -3684,7 +3684,7 @@
             <a:pPr lvl="0"/>
             <a:r>
               <a:rPr/>
-              <a:t>Additional processing beyond the current testing framework is needed to interpret the errors.</a:t>
+              <a:t>You will need to check the output yourself occasionally to verify the overall test suite result.</a:t>
             </a:r>
           </a:p>
         </p:txBody>
@@ -3814,21 +3814,21 @@
             <a:pPr lvl="0"/>
             <a:r>
               <a:rPr/>
-              <a:t>Since monolithic tests have only a pass/fail result, and there are multiple expected failures, it’s possible to miss failures</a:t>
-            </a:r>
-          </a:p>
-          <a:p>
-            <a:pPr lvl="0"/>
-            <a:r>
-              <a:rPr/>
-              <a:t>This can be mitigated by expecting a certain number of failures, or checking for specific failure messages</a:t>
-            </a:r>
-          </a:p>
-          <a:p>
-            <a:pPr lvl="1"/>
-            <a:r>
-              <a:rPr/>
-              <a:t>This would require updates to the testing framework</a:t>
+              <a:t>Monolithic tests require more interpretation that granular tests.</a:t>
+            </a:r>
+          </a:p>
+          <a:p>
+            <a:pPr lvl="0"/>
+            <a:r>
+              <a:rPr/>
+              <a:t>The testing system could miss labels that fail for the wrong reason</a:t>
+            </a:r>
+          </a:p>
+          <a:p>
+            <a:pPr lvl="0"/>
+            <a:r>
+              <a:rPr/>
+              <a:t>Log files are built with each push, so check in there for more information</a:t>
             </a:r>
           </a:p>
         </p:txBody>
@@ -3898,21 +3898,21 @@
             <a:pPr lvl="0"/>
             <a:r>
               <a:rPr/>
-              <a:t>You want to have enough to thoroughly test your dictionary.</a:t>
-            </a:r>
-          </a:p>
-          <a:p>
-            <a:pPr lvl="1"/>
-            <a:r>
-              <a:rPr/>
-              <a:t>Typically, this means that every class should be used at least once</a:t>
-            </a:r>
-          </a:p>
-          <a:p>
-            <a:pPr lvl="1"/>
-            <a:r>
-              <a:rPr/>
-              <a:t>Every Schematron rule should pass and fail at least once, as well.</a:t>
+              <a:t>There are a lot of things that you can test for your dictionary.</a:t>
+            </a:r>
+          </a:p>
+          <a:p>
+            <a:pPr lvl="0"/>
+            <a:r>
+              <a:rPr/>
+              <a:t>Some tests are more valuable than others</a:t>
+            </a:r>
+          </a:p>
+          <a:p>
+            <a:pPr lvl="0"/>
+            <a:r>
+              <a:rPr/>
+              <a:t>Which tests are the most important to write?</a:t>
             </a:r>
           </a:p>
         </p:txBody>
@@ -4014,6 +4014,13 @@
               <a:t>A test should have its own job – it shouldn’t just functionally duplicate another test</a:t>
             </a:r>
           </a:p>
+          <a:p>
+            <a:pPr lvl="2"/>
+            <a:r>
+              <a:rPr/>
+              <a:t>More simply, keeping the same structure, but switching between valid values is not a high-value activity.</a:t>
+            </a:r>
+          </a:p>
         </p:txBody>
       </p:sp>
     </p:spTree>
@@ -4058,7 +4065,7 @@
             </a:pPr>
             <a:r>
               <a:rPr/>
-              <a:t>Exercise every class</a:t>
+              <a:t>Testing classes</a:t>
             </a:r>
           </a:p>
         </p:txBody>
@@ -4081,14 +4088,22 @@
             <a:pPr lvl="0"/>
             <a:r>
               <a:rPr/>
-              <a:t>At minimum, at least one passing test should use each public class</a:t>
-            </a:r>
-          </a:p>
-          <a:p>
-            <a:pPr lvl="0"/>
-            <a:r>
-              <a:rPr/>
-              <a:t>At least one passing test should use each class</a:t>
+              <a:t>You could write many tests to use each combination of classes, but this is not necessarily valuable.</a:t>
+            </a:r>
+          </a:p>
+          <a:p>
+            <a:pPr lvl="0"/>
+            <a:r>
+              <a:rPr/>
+              <a:t>It </a:t>
+            </a:r>
+            <a:r>
+              <a:rPr i="1"/>
+              <a:t>is</a:t>
+            </a:r>
+            <a:r>
+              <a:rPr/>
+              <a:t> more valuable to test the minimal description that you can include in each public class.</a:t>
             </a:r>
           </a:p>
           <a:p>
@@ -4096,13 +4111,6 @@
             <a:r>
               <a:rPr/>
               <a:t>It is better to write tests specifically for this, so that other tests still have only one job.</a:t>
-            </a:r>
-          </a:p>
-          <a:p>
-            <a:pPr lvl="0"/>
-            <a:r>
-              <a:rPr/>
-              <a:t>Write as many test files as necessary to achieve this.</a:t>
             </a:r>
           </a:p>
         </p:txBody>
@@ -4149,7 +4157,7 @@
             </a:pPr>
             <a:r>
               <a:rPr/>
-              <a:t>Exercise every Schematron rule</a:t>
+              <a:t>Exercising Schematron rules</a:t>
             </a:r>
           </a:p>
         </p:txBody>
@@ -4172,28 +4180,21 @@
             <a:pPr lvl="0"/>
             <a:r>
               <a:rPr/>
-              <a:t>At least one invalid label test should fail each Schematron rule.</a:t>
-            </a:r>
-          </a:p>
-          <a:p>
-            <a:pPr lvl="0"/>
-            <a:r>
-              <a:rPr/>
-              <a:t>At least one valid label test should pass each Schematron rule</a:t>
-            </a:r>
-          </a:p>
-          <a:p>
-            <a:pPr lvl="0"/>
-            <a:r>
-              <a:rPr/>
-              <a:t>At least one valid label test should not trigger the Schematron rule, if possible.</a:t>
-            </a:r>
-          </a:p>
-          <a:p>
-            <a:pPr lvl="0"/>
-            <a:r>
-              <a:rPr/>
-              <a:t>Exercising the schematron rules is especially important, since Schematron rules can be prevented from triggering if incorrectly written.</a:t>
+              <a:t>An invalid label test could fail on Schematron rules.</a:t>
+            </a:r>
+          </a:p>
+          <a:p>
+            <a:pPr lvl="0"/>
+            <a:r>
+              <a:rPr/>
+              <a:t>Valid label tests could pass on Schematron rule, or not trigger the rule at all</a:t>
+            </a:r>
+          </a:p>
+          <a:p>
+            <a:pPr lvl="0"/>
+            <a:r>
+              <a:rPr/>
+              <a:t>Exercising schematron rules is valuable, since they represent exceptions to the exisitng system.</a:t>
             </a:r>
           </a:p>
         </p:txBody>
@@ -4456,14 +4457,14 @@
             <a:pPr lvl="0"/>
             <a:r>
               <a:rPr/>
-              <a:t>Ensure that all class definitions are correct</a:t>
-            </a:r>
-          </a:p>
-          <a:p>
-            <a:pPr lvl="0"/>
-            <a:r>
-              <a:rPr/>
-              <a:t>Ensure that all of the schematron rules work</a:t>
+              <a:t>Ensure that the data that is required is actually captured</a:t>
+            </a:r>
+          </a:p>
+          <a:p>
+            <a:pPr lvl="0"/>
+            <a:r>
+              <a:rPr/>
+              <a:t>Ensure that the schematron rules work</a:t>
             </a:r>
           </a:p>
           <a:p>
@@ -5297,7 +5298,7 @@
             <a:pPr lvl="0"/>
             <a:r>
               <a:rPr/>
-              <a:t>Minimize Redundancy</a:t>
+              <a:t>Minimizing Redundancy</a:t>
             </a:r>
           </a:p>
           <a:p>
@@ -5458,14 +5459,21 @@
             <a:pPr lvl="0"/>
             <a:r>
               <a:rPr/>
-              <a:t>The testing framework that we are using is better suited for granular tests</a:t>
-            </a:r>
-          </a:p>
-          <a:p>
-            <a:pPr lvl="0"/>
-            <a:r>
-              <a:rPr/>
-              <a:t>Monolithic tests are currently easier to generate and maintain</a:t>
+              <a:t>Two possible styles of invalid label test are monolithic tests and granular tests</a:t>
+            </a:r>
+          </a:p>
+          <a:p>
+            <a:pPr lvl="0"/>
+            <a:r>
+              <a:rPr/>
+              <a:t>Monolithic tests have few labels with many introduced errors per test</a:t>
+            </a:r>
+          </a:p>
+          <a:p>
+            <a:pPr lvl="0"/>
+            <a:r>
+              <a:rPr/>
+              <a:t>Granular tests have many labels with few introduved errors per test</a:t>
             </a:r>
           </a:p>
         </p:txBody>
@@ -5542,7 +5550,7 @@
             <a:pPr lvl="0"/>
             <a:r>
               <a:rPr/>
-              <a:t>Combining multiple errors in a single file will mask errors that don’t occur, since the testing framework only knows if a label passed or failed.</a:t>
+              <a:t>This simplified interpreting the results, both for you and for the testing framework.</a:t>
             </a:r>
           </a:p>
         </p:txBody>
@@ -5731,7 +5739,7 @@
             <a:pPr lvl="0"/>
             <a:r>
               <a:rPr/>
-              <a:t>This is enough the trip the validator. When a tests fails, it’s for a single reason.</a:t>
+              <a:t>This is enough the trip the validator. When a label fails, it’s for a single reason.</a:t>
             </a:r>
           </a:p>
         </p:txBody>

</xml_diff>

<commit_message>
Added one more comment on the number of tests
</commit_message>
<xml_diff>
--- a/LDDTesting/stone-LDDTestingTechniques.pptx
+++ b/LDDTesting/stone-LDDTestingTechniques.pptx
@@ -3894,6 +3894,13 @@
         <p:txBody>
           <a:bodyPr/>
           <a:lstStyle/>
+          <a:p>
+            <a:pPr lvl="0"/>
+            <a:r>
+              <a:rPr i="1"/>
+              <a:t>Any tests are better than no tests.</a:t>
+            </a:r>
+          </a:p>
           <a:p>
             <a:pPr lvl="0"/>
             <a:r>

</xml_diff>